<commit_message>
Add versão final da apresentação
</commit_message>
<xml_diff>
--- a/Apresentação Monografia - Giovanni.pptx
+++ b/Apresentação Monografia - Giovanni.pptx
@@ -1,17 +1,17 @@
 
 <file path=ppt/presentation.xml><?xml version="1.0" encoding="utf-8"?>
-<p:presentation xmlns:a="http://schemas.openxmlformats.org/drawingml/2006/main" xmlns:r="http://schemas.openxmlformats.org/officeDocument/2006/relationships" xmlns:p="http://schemas.openxmlformats.org/presentationml/2006/main" autoCompressPictures="0">
+<p:presentation xmlns:a="http://schemas.openxmlformats.org/drawingml/2006/main" xmlns:r="http://schemas.openxmlformats.org/officeDocument/2006/relationships" xmlns:p="http://schemas.openxmlformats.org/presentationml/2006/main" saveSubsetFonts="1">
   <p:sldMasterIdLst>
-    <p:sldMasterId id="2147483681" r:id="rId1"/>
+    <p:sldMasterId id="2147483648" r:id="rId1"/>
   </p:sldMasterIdLst>
   <p:sldIdLst>
-    <p:sldId id="256" r:id="rId2"/>
+    <p:sldId id="257" r:id="rId2"/>
     <p:sldId id="289" r:id="rId3"/>
     <p:sldId id="290" r:id="rId4"/>
     <p:sldId id="291" r:id="rId5"/>
     <p:sldId id="292" r:id="rId6"/>
-    <p:sldId id="293" r:id="rId7"/>
-    <p:sldId id="294" r:id="rId8"/>
+    <p:sldId id="294" r:id="rId7"/>
+    <p:sldId id="293" r:id="rId8"/>
     <p:sldId id="295" r:id="rId9"/>
     <p:sldId id="299" r:id="rId10"/>
     <p:sldId id="296" r:id="rId11"/>
@@ -31,6 +31,7 @@
     <p:sldId id="311" r:id="rId25"/>
     <p:sldId id="312" r:id="rId26"/>
     <p:sldId id="313" r:id="rId27"/>
+    <p:sldId id="314" r:id="rId28"/>
   </p:sldIdLst>
   <p:sldSz cx="12192000" cy="6858000"/>
   <p:notesSz cx="6858000" cy="9144000"/>
@@ -137,6 +138,120 @@
 </p:presentation>
 </file>
 
+<file path=ppt/revisionInfo.xml><?xml version="1.0" encoding="utf-8"?>
+<p1510:revInfo xmlns:a="http://schemas.openxmlformats.org/drawingml/2006/main" xmlns:r="http://schemas.openxmlformats.org/officeDocument/2006/relationships" xmlns:p1510="http://schemas.microsoft.com/office/powerpoint/2015/10/main">
+  <p1510:revLst>
+    <p1510:client id="{45A2B1CD-D399-4AC0-9870-AE3824DCC07C}" v="11" dt="2021-03-09T00:52:44.142"/>
+  </p1510:revLst>
+</p1510:revInfo>
+</file>
+
+<file path=ppt/changesInfos/changesInfo1.xml><?xml version="1.0" encoding="utf-8"?>
+<pc:chgInfo xmlns:a="http://schemas.openxmlformats.org/drawingml/2006/main" xmlns:r="http://schemas.openxmlformats.org/officeDocument/2006/relationships" xmlns:ac="http://schemas.microsoft.com/office/drawing/2013/main/command" xmlns:pc="http://schemas.microsoft.com/office/powerpoint/2013/main/command">
+  <pc:docChgLst>
+    <pc:chgData name="Giovanni Gentile" userId="3feb5d687010bdf5" providerId="LiveId" clId="{45A2B1CD-D399-4AC0-9870-AE3824DCC07C}"/>
+    <pc:docChg chg="undo custSel addSld modSld">
+      <pc:chgData name="Giovanni Gentile" userId="3feb5d687010bdf5" providerId="LiveId" clId="{45A2B1CD-D399-4AC0-9870-AE3824DCC07C}" dt="2021-03-09T22:08:40.524" v="40" actId="20577"/>
+      <pc:docMkLst>
+        <pc:docMk/>
+      </pc:docMkLst>
+      <pc:sldChg chg="addSp delSp">
+        <pc:chgData name="Giovanni Gentile" userId="3feb5d687010bdf5" providerId="LiveId" clId="{45A2B1CD-D399-4AC0-9870-AE3824DCC07C}" dt="2021-03-09T00:51:53.590" v="13" actId="21"/>
+        <pc:sldMkLst>
+          <pc:docMk/>
+          <pc:sldMk cId="2531700824" sldId="257"/>
+        </pc:sldMkLst>
+        <pc:picChg chg="add del">
+          <ac:chgData name="Giovanni Gentile" userId="3feb5d687010bdf5" providerId="LiveId" clId="{45A2B1CD-D399-4AC0-9870-AE3824DCC07C}" dt="2021-03-09T00:51:53.590" v="13" actId="21"/>
+          <ac:picMkLst>
+            <pc:docMk/>
+            <pc:sldMk cId="2531700824" sldId="257"/>
+            <ac:picMk id="8193" creationId="{8E5F410A-8D96-4DE3-A996-296077E64924}"/>
+          </ac:picMkLst>
+        </pc:picChg>
+      </pc:sldChg>
+      <pc:sldChg chg="modSp mod">
+        <pc:chgData name="Giovanni Gentile" userId="3feb5d687010bdf5" providerId="LiveId" clId="{45A2B1CD-D399-4AC0-9870-AE3824DCC07C}" dt="2021-03-09T00:51:02.538" v="0" actId="6549"/>
+        <pc:sldMkLst>
+          <pc:docMk/>
+          <pc:sldMk cId="1087334651" sldId="292"/>
+        </pc:sldMkLst>
+        <pc:spChg chg="mod">
+          <ac:chgData name="Giovanni Gentile" userId="3feb5d687010bdf5" providerId="LiveId" clId="{45A2B1CD-D399-4AC0-9870-AE3824DCC07C}" dt="2021-03-09T00:51:02.538" v="0" actId="6549"/>
+          <ac:spMkLst>
+            <pc:docMk/>
+            <pc:sldMk cId="1087334651" sldId="292"/>
+            <ac:spMk id="3" creationId="{6205D89A-45D6-4985-A2DC-B782075B7235}"/>
+          </ac:spMkLst>
+        </pc:spChg>
+      </pc:sldChg>
+      <pc:sldChg chg="modSp mod">
+        <pc:chgData name="Giovanni Gentile" userId="3feb5d687010bdf5" providerId="LiveId" clId="{45A2B1CD-D399-4AC0-9870-AE3824DCC07C}" dt="2021-03-09T22:08:40.524" v="40" actId="20577"/>
+        <pc:sldMkLst>
+          <pc:docMk/>
+          <pc:sldMk cId="1154063287" sldId="294"/>
+        </pc:sldMkLst>
+        <pc:spChg chg="mod">
+          <ac:chgData name="Giovanni Gentile" userId="3feb5d687010bdf5" providerId="LiveId" clId="{45A2B1CD-D399-4AC0-9870-AE3824DCC07C}" dt="2021-03-09T22:08:40.524" v="40" actId="20577"/>
+          <ac:spMkLst>
+            <pc:docMk/>
+            <pc:sldMk cId="1154063287" sldId="294"/>
+            <ac:spMk id="3" creationId="{A2D8BE35-F8D6-450A-A3C0-60D760579484}"/>
+          </ac:spMkLst>
+        </pc:spChg>
+      </pc:sldChg>
+      <pc:sldChg chg="addSp delSp modSp new mod">
+        <pc:chgData name="Giovanni Gentile" userId="3feb5d687010bdf5" providerId="LiveId" clId="{45A2B1CD-D399-4AC0-9870-AE3824DCC07C}" dt="2021-03-09T00:52:51.117" v="31" actId="20577"/>
+        <pc:sldMkLst>
+          <pc:docMk/>
+          <pc:sldMk cId="1019569165" sldId="314"/>
+        </pc:sldMkLst>
+        <pc:spChg chg="del">
+          <ac:chgData name="Giovanni Gentile" userId="3feb5d687010bdf5" providerId="LiveId" clId="{45A2B1CD-D399-4AC0-9870-AE3824DCC07C}" dt="2021-03-09T00:51:35.242" v="2"/>
+          <ac:spMkLst>
+            <pc:docMk/>
+            <pc:sldMk cId="1019569165" sldId="314"/>
+            <ac:spMk id="2" creationId="{C2A069EF-B840-47F8-ABF1-0DD6B9599D65}"/>
+          </ac:spMkLst>
+        </pc:spChg>
+        <pc:spChg chg="del">
+          <ac:chgData name="Giovanni Gentile" userId="3feb5d687010bdf5" providerId="LiveId" clId="{45A2B1CD-D399-4AC0-9870-AE3824DCC07C}" dt="2021-03-09T00:51:35.242" v="2"/>
+          <ac:spMkLst>
+            <pc:docMk/>
+            <pc:sldMk cId="1019569165" sldId="314"/>
+            <ac:spMk id="3" creationId="{D91CFB94-4599-450D-9D74-74B820778E36}"/>
+          </ac:spMkLst>
+        </pc:spChg>
+        <pc:spChg chg="add mod">
+          <ac:chgData name="Giovanni Gentile" userId="3feb5d687010bdf5" providerId="LiveId" clId="{45A2B1CD-D399-4AC0-9870-AE3824DCC07C}" dt="2021-03-09T00:52:51.117" v="31" actId="20577"/>
+          <ac:spMkLst>
+            <pc:docMk/>
+            <pc:sldMk cId="1019569165" sldId="314"/>
+            <ac:spMk id="4" creationId="{4B7820EE-BCAA-4ABB-8F7C-85DF55482910}"/>
+          </ac:spMkLst>
+        </pc:spChg>
+        <pc:spChg chg="add del mod">
+          <ac:chgData name="Giovanni Gentile" userId="3feb5d687010bdf5" providerId="LiveId" clId="{45A2B1CD-D399-4AC0-9870-AE3824DCC07C}" dt="2021-03-09T00:52:23.432" v="21" actId="478"/>
+          <ac:spMkLst>
+            <pc:docMk/>
+            <pc:sldMk cId="1019569165" sldId="314"/>
+            <ac:spMk id="5" creationId="{0FAA5C31-7CF9-47C5-9E4F-64C4602BA914}"/>
+          </ac:spMkLst>
+        </pc:spChg>
+        <pc:picChg chg="add del mod">
+          <ac:chgData name="Giovanni Gentile" userId="3feb5d687010bdf5" providerId="LiveId" clId="{45A2B1CD-D399-4AC0-9870-AE3824DCC07C}" dt="2021-03-09T00:52:44.142" v="29" actId="478"/>
+          <ac:picMkLst>
+            <pc:docMk/>
+            <pc:sldMk cId="1019569165" sldId="314"/>
+            <ac:picMk id="6" creationId="{C3178D00-4971-450B-BB22-1D0F1243C45F}"/>
+          </ac:picMkLst>
+        </pc:picChg>
+      </pc:sldChg>
+    </pc:docChg>
+  </pc:docChgLst>
+</pc:chgInfo>
+</file>
+
 <file path=ppt/slideLayouts/slideLayout1.xml><?xml version="1.0" encoding="utf-8"?>
 <p:sldLayout xmlns:a="http://schemas.openxmlformats.org/drawingml/2006/main" xmlns:r="http://schemas.openxmlformats.org/officeDocument/2006/relationships" xmlns:p="http://schemas.openxmlformats.org/presentationml/2006/main" type="title" preserve="1">
   <p:cSld name="Slide de Título">
@@ -159,7 +274,7 @@
           <p:cNvPr id="2" name="Título 1">
             <a:extLst>
               <a:ext uri="{FF2B5EF4-FFF2-40B4-BE49-F238E27FC236}">
-                <a16:creationId xmlns:a16="http://schemas.microsoft.com/office/drawing/2014/main" id="{0EBDCED5-E3D7-4BCA-8DCC-3BC219717B66}"/>
+                <a16:creationId xmlns:a16="http://schemas.microsoft.com/office/drawing/2014/main" id="{F1AF093C-9DE1-411E-A5F1-DF1C94F7603B}"/>
               </a:ext>
             </a:extLst>
           </p:cNvPr>
@@ -196,7 +311,7 @@
           <p:cNvPr id="3" name="Subtítulo 2">
             <a:extLst>
               <a:ext uri="{FF2B5EF4-FFF2-40B4-BE49-F238E27FC236}">
-                <a16:creationId xmlns:a16="http://schemas.microsoft.com/office/drawing/2014/main" id="{83459549-2CFA-40AB-91DE-2E7892BC2C66}"/>
+                <a16:creationId xmlns:a16="http://schemas.microsoft.com/office/drawing/2014/main" id="{19DAE003-4EAB-43D3-AEBD-9D263A033B68}"/>
               </a:ext>
             </a:extLst>
           </p:cNvPr>
@@ -266,7 +381,7 @@
           <p:cNvPr id="4" name="Espaço Reservado para Data 3">
             <a:extLst>
               <a:ext uri="{FF2B5EF4-FFF2-40B4-BE49-F238E27FC236}">
-                <a16:creationId xmlns:a16="http://schemas.microsoft.com/office/drawing/2014/main" id="{C1FEDAD2-47FD-4B9E-8E12-AC87520918FA}"/>
+                <a16:creationId xmlns:a16="http://schemas.microsoft.com/office/drawing/2014/main" id="{F03DE851-C2CE-489A-9607-4DAA7F6D2110}"/>
               </a:ext>
             </a:extLst>
           </p:cNvPr>
@@ -282,11 +397,11 @@
           <a:bodyPr/>
           <a:lstStyle/>
           <a:p>
-            <a:fld id="{48A87A34-81AB-432B-8DAE-1953F412C126}" type="datetimeFigureOut">
-              <a:rPr lang="en-US" smtClean="0"/>
-              <a:t>2/28/2021</a:t>
+            <a:fld id="{DFB1C530-B720-4979-85E3-1B39C2E0B423}" type="datetimeFigureOut">
+              <a:rPr lang="pt-BR" smtClean="0"/>
+              <a:t>09/03/2021</a:t>
             </a:fld>
-            <a:endParaRPr lang="en-US" dirty="0"/>
+            <a:endParaRPr lang="pt-BR"/>
           </a:p>
         </p:txBody>
       </p:sp>
@@ -295,7 +410,7 @@
           <p:cNvPr id="5" name="Espaço Reservado para Rodapé 4">
             <a:extLst>
               <a:ext uri="{FF2B5EF4-FFF2-40B4-BE49-F238E27FC236}">
-                <a16:creationId xmlns:a16="http://schemas.microsoft.com/office/drawing/2014/main" id="{DCDC3901-20A1-4ED3-BF8F-F65EBDDB1AEA}"/>
+                <a16:creationId xmlns:a16="http://schemas.microsoft.com/office/drawing/2014/main" id="{5E5FC20F-8C14-4645-BCFC-99856AF6F370}"/>
               </a:ext>
             </a:extLst>
           </p:cNvPr>
@@ -311,7 +426,7 @@
           <a:bodyPr/>
           <a:lstStyle/>
           <a:p>
-            <a:endParaRPr lang="en-US" dirty="0"/>
+            <a:endParaRPr lang="pt-BR"/>
           </a:p>
         </p:txBody>
       </p:sp>
@@ -320,7 +435,7 @@
           <p:cNvPr id="6" name="Espaço Reservado para Número de Slide 5">
             <a:extLst>
               <a:ext uri="{FF2B5EF4-FFF2-40B4-BE49-F238E27FC236}">
-                <a16:creationId xmlns:a16="http://schemas.microsoft.com/office/drawing/2014/main" id="{195E9549-D399-4A09-B8CE-40D56E5E433C}"/>
+                <a16:creationId xmlns:a16="http://schemas.microsoft.com/office/drawing/2014/main" id="{0E54A6A3-4F19-4560-A249-AD1205C13AF7}"/>
               </a:ext>
             </a:extLst>
           </p:cNvPr>
@@ -336,18 +451,18 @@
           <a:bodyPr/>
           <a:lstStyle/>
           <a:p>
-            <a:fld id="{6D22F896-40B5-4ADD-8801-0D06FADFA095}" type="slidenum">
-              <a:rPr lang="en-US" smtClean="0"/>
+            <a:fld id="{CFBB1475-ECF0-4314-822B-D651C560891E}" type="slidenum">
+              <a:rPr lang="pt-BR" smtClean="0"/>
               <a:t>‹nº›</a:t>
             </a:fld>
-            <a:endParaRPr lang="en-US" dirty="0"/>
+            <a:endParaRPr lang="pt-BR"/>
           </a:p>
         </p:txBody>
       </p:sp>
     </p:spTree>
     <p:extLst>
       <p:ext uri="{BB962C8B-B14F-4D97-AF65-F5344CB8AC3E}">
-        <p14:creationId xmlns:p14="http://schemas.microsoft.com/office/powerpoint/2010/main" val="290994190"/>
+        <p14:creationId xmlns:p14="http://schemas.microsoft.com/office/powerpoint/2010/main" val="1176049291"/>
       </p:ext>
     </p:extLst>
   </p:cSld>
@@ -379,7 +494,7 @@
           <p:cNvPr id="2" name="Título 1">
             <a:extLst>
               <a:ext uri="{FF2B5EF4-FFF2-40B4-BE49-F238E27FC236}">
-                <a16:creationId xmlns:a16="http://schemas.microsoft.com/office/drawing/2014/main" id="{2970A7A9-6124-4EB8-8899-FBA343771118}"/>
+                <a16:creationId xmlns:a16="http://schemas.microsoft.com/office/drawing/2014/main" id="{B650F759-A901-4769-A06A-4F36DC3C808E}"/>
               </a:ext>
             </a:extLst>
           </p:cNvPr>
@@ -407,7 +522,7 @@
           <p:cNvPr id="3" name="Espaço Reservado para Texto Vertical 2">
             <a:extLst>
               <a:ext uri="{FF2B5EF4-FFF2-40B4-BE49-F238E27FC236}">
-                <a16:creationId xmlns:a16="http://schemas.microsoft.com/office/drawing/2014/main" id="{B3EB52FD-2129-4303-A617-7D5CCCB1EE9A}"/>
+                <a16:creationId xmlns:a16="http://schemas.microsoft.com/office/drawing/2014/main" id="{5F26E262-3E34-4EA1-BAF6-4DA8DC9902FB}"/>
               </a:ext>
             </a:extLst>
           </p:cNvPr>
@@ -464,7 +579,7 @@
           <p:cNvPr id="4" name="Espaço Reservado para Data 3">
             <a:extLst>
               <a:ext uri="{FF2B5EF4-FFF2-40B4-BE49-F238E27FC236}">
-                <a16:creationId xmlns:a16="http://schemas.microsoft.com/office/drawing/2014/main" id="{DACA8563-D822-41EE-972F-1B1A287DF980}"/>
+                <a16:creationId xmlns:a16="http://schemas.microsoft.com/office/drawing/2014/main" id="{2410E645-2A5E-424F-ADFF-7151AB3893C6}"/>
               </a:ext>
             </a:extLst>
           </p:cNvPr>
@@ -480,11 +595,11 @@
           <a:bodyPr/>
           <a:lstStyle/>
           <a:p>
-            <a:fld id="{48A87A34-81AB-432B-8DAE-1953F412C126}" type="datetimeFigureOut">
-              <a:rPr lang="en-US" smtClean="0"/>
-              <a:t>2/28/2021</a:t>
+            <a:fld id="{DFB1C530-B720-4979-85E3-1B39C2E0B423}" type="datetimeFigureOut">
+              <a:rPr lang="pt-BR" smtClean="0"/>
+              <a:t>09/03/2021</a:t>
             </a:fld>
-            <a:endParaRPr lang="en-US" dirty="0"/>
+            <a:endParaRPr lang="pt-BR"/>
           </a:p>
         </p:txBody>
       </p:sp>
@@ -493,7 +608,7 @@
           <p:cNvPr id="5" name="Espaço Reservado para Rodapé 4">
             <a:extLst>
               <a:ext uri="{FF2B5EF4-FFF2-40B4-BE49-F238E27FC236}">
-                <a16:creationId xmlns:a16="http://schemas.microsoft.com/office/drawing/2014/main" id="{9D953102-D3AF-4862-AB78-A68E2BBC5C9E}"/>
+                <a16:creationId xmlns:a16="http://schemas.microsoft.com/office/drawing/2014/main" id="{29E2A78A-55D9-425E-968C-40EF29C89CE2}"/>
               </a:ext>
             </a:extLst>
           </p:cNvPr>
@@ -509,7 +624,7 @@
           <a:bodyPr/>
           <a:lstStyle/>
           <a:p>
-            <a:endParaRPr lang="en-US" dirty="0"/>
+            <a:endParaRPr lang="pt-BR"/>
           </a:p>
         </p:txBody>
       </p:sp>
@@ -518,7 +633,7 @@
           <p:cNvPr id="6" name="Espaço Reservado para Número de Slide 5">
             <a:extLst>
               <a:ext uri="{FF2B5EF4-FFF2-40B4-BE49-F238E27FC236}">
-                <a16:creationId xmlns:a16="http://schemas.microsoft.com/office/drawing/2014/main" id="{C0F60EA9-A35D-4846-8AB0-D82E8D6F7F4E}"/>
+                <a16:creationId xmlns:a16="http://schemas.microsoft.com/office/drawing/2014/main" id="{51CB198E-FA2C-4A6E-9636-FD3789B1F661}"/>
               </a:ext>
             </a:extLst>
           </p:cNvPr>
@@ -534,18 +649,18 @@
           <a:bodyPr/>
           <a:lstStyle/>
           <a:p>
-            <a:fld id="{6D22F896-40B5-4ADD-8801-0D06FADFA095}" type="slidenum">
-              <a:rPr lang="en-US" smtClean="0"/>
+            <a:fld id="{CFBB1475-ECF0-4314-822B-D651C560891E}" type="slidenum">
+              <a:rPr lang="pt-BR" smtClean="0"/>
               <a:t>‹nº›</a:t>
             </a:fld>
-            <a:endParaRPr lang="en-US" dirty="0"/>
+            <a:endParaRPr lang="pt-BR"/>
           </a:p>
         </p:txBody>
       </p:sp>
     </p:spTree>
     <p:extLst>
       <p:ext uri="{BB962C8B-B14F-4D97-AF65-F5344CB8AC3E}">
-        <p14:creationId xmlns:p14="http://schemas.microsoft.com/office/powerpoint/2010/main" val="2624682101"/>
+        <p14:creationId xmlns:p14="http://schemas.microsoft.com/office/powerpoint/2010/main" val="2478316695"/>
       </p:ext>
     </p:extLst>
   </p:cSld>
@@ -577,7 +692,7 @@
           <p:cNvPr id="2" name="Título Vertical 1">
             <a:extLst>
               <a:ext uri="{FF2B5EF4-FFF2-40B4-BE49-F238E27FC236}">
-                <a16:creationId xmlns:a16="http://schemas.microsoft.com/office/drawing/2014/main" id="{5C09ED33-7123-4D4C-A85A-638143039415}"/>
+                <a16:creationId xmlns:a16="http://schemas.microsoft.com/office/drawing/2014/main" id="{173521C3-1E5A-49D5-92E5-8F04B41D5B4D}"/>
               </a:ext>
             </a:extLst>
           </p:cNvPr>
@@ -610,7 +725,7 @@
           <p:cNvPr id="3" name="Espaço Reservado para Texto Vertical 2">
             <a:extLst>
               <a:ext uri="{FF2B5EF4-FFF2-40B4-BE49-F238E27FC236}">
-                <a16:creationId xmlns:a16="http://schemas.microsoft.com/office/drawing/2014/main" id="{A38F368D-78A4-442A-B678-AA3961B3AEC8}"/>
+                <a16:creationId xmlns:a16="http://schemas.microsoft.com/office/drawing/2014/main" id="{F4DDFA3C-5F76-4931-8BE6-2511481811C3}"/>
               </a:ext>
             </a:extLst>
           </p:cNvPr>
@@ -672,7 +787,7 @@
           <p:cNvPr id="4" name="Espaço Reservado para Data 3">
             <a:extLst>
               <a:ext uri="{FF2B5EF4-FFF2-40B4-BE49-F238E27FC236}">
-                <a16:creationId xmlns:a16="http://schemas.microsoft.com/office/drawing/2014/main" id="{91B169AE-2BB3-4FF3-81FA-33AAF1F31F43}"/>
+                <a16:creationId xmlns:a16="http://schemas.microsoft.com/office/drawing/2014/main" id="{9B10B3E0-666B-44A1-A591-060FAD58D343}"/>
               </a:ext>
             </a:extLst>
           </p:cNvPr>
@@ -688,11 +803,11 @@
           <a:bodyPr/>
           <a:lstStyle/>
           <a:p>
-            <a:fld id="{48A87A34-81AB-432B-8DAE-1953F412C126}" type="datetimeFigureOut">
-              <a:rPr lang="en-US" smtClean="0"/>
-              <a:t>2/28/2021</a:t>
+            <a:fld id="{DFB1C530-B720-4979-85E3-1B39C2E0B423}" type="datetimeFigureOut">
+              <a:rPr lang="pt-BR" smtClean="0"/>
+              <a:t>09/03/2021</a:t>
             </a:fld>
-            <a:endParaRPr lang="en-US" dirty="0"/>
+            <a:endParaRPr lang="pt-BR"/>
           </a:p>
         </p:txBody>
       </p:sp>
@@ -701,7 +816,7 @@
           <p:cNvPr id="5" name="Espaço Reservado para Rodapé 4">
             <a:extLst>
               <a:ext uri="{FF2B5EF4-FFF2-40B4-BE49-F238E27FC236}">
-                <a16:creationId xmlns:a16="http://schemas.microsoft.com/office/drawing/2014/main" id="{D6CEAA82-E33A-4174-9A3E-EDC3A0CAAD8A}"/>
+                <a16:creationId xmlns:a16="http://schemas.microsoft.com/office/drawing/2014/main" id="{0374FE79-BB48-4E14-AC31-5395F15A89C3}"/>
               </a:ext>
             </a:extLst>
           </p:cNvPr>
@@ -717,7 +832,7 @@
           <a:bodyPr/>
           <a:lstStyle/>
           <a:p>
-            <a:endParaRPr lang="en-US" dirty="0"/>
+            <a:endParaRPr lang="pt-BR"/>
           </a:p>
         </p:txBody>
       </p:sp>
@@ -726,7 +841,7 @@
           <p:cNvPr id="6" name="Espaço Reservado para Número de Slide 5">
             <a:extLst>
               <a:ext uri="{FF2B5EF4-FFF2-40B4-BE49-F238E27FC236}">
-                <a16:creationId xmlns:a16="http://schemas.microsoft.com/office/drawing/2014/main" id="{BA017037-648D-4A7D-9E26-0192C2361E21}"/>
+                <a16:creationId xmlns:a16="http://schemas.microsoft.com/office/drawing/2014/main" id="{2F9C0DA3-FFB0-42ED-928A-6D1CC9ACD385}"/>
               </a:ext>
             </a:extLst>
           </p:cNvPr>
@@ -742,18 +857,18 @@
           <a:bodyPr/>
           <a:lstStyle/>
           <a:p>
-            <a:fld id="{6D22F896-40B5-4ADD-8801-0D06FADFA095}" type="slidenum">
-              <a:rPr lang="en-US" smtClean="0"/>
+            <a:fld id="{CFBB1475-ECF0-4314-822B-D651C560891E}" type="slidenum">
+              <a:rPr lang="pt-BR" smtClean="0"/>
               <a:t>‹nº›</a:t>
             </a:fld>
-            <a:endParaRPr lang="en-US" dirty="0"/>
+            <a:endParaRPr lang="pt-BR"/>
           </a:p>
         </p:txBody>
       </p:sp>
     </p:spTree>
     <p:extLst>
       <p:ext uri="{BB962C8B-B14F-4D97-AF65-F5344CB8AC3E}">
-        <p14:creationId xmlns:p14="http://schemas.microsoft.com/office/powerpoint/2010/main" val="1699985140"/>
+        <p14:creationId xmlns:p14="http://schemas.microsoft.com/office/powerpoint/2010/main" val="2935556131"/>
       </p:ext>
     </p:extLst>
   </p:cSld>
@@ -785,7 +900,7 @@
           <p:cNvPr id="2" name="Título 1">
             <a:extLst>
               <a:ext uri="{FF2B5EF4-FFF2-40B4-BE49-F238E27FC236}">
-                <a16:creationId xmlns:a16="http://schemas.microsoft.com/office/drawing/2014/main" id="{554F9413-4191-42C4-9AE8-1988B0FC9AF7}"/>
+                <a16:creationId xmlns:a16="http://schemas.microsoft.com/office/drawing/2014/main" id="{11FA0E7E-9FE5-4DAD-AF37-1931B2B1D112}"/>
               </a:ext>
             </a:extLst>
           </p:cNvPr>
@@ -813,7 +928,7 @@
           <p:cNvPr id="3" name="Espaço Reservado para Conteúdo 2">
             <a:extLst>
               <a:ext uri="{FF2B5EF4-FFF2-40B4-BE49-F238E27FC236}">
-                <a16:creationId xmlns:a16="http://schemas.microsoft.com/office/drawing/2014/main" id="{05B565B2-E1F4-4082-B9BB-9B58CA236517}"/>
+                <a16:creationId xmlns:a16="http://schemas.microsoft.com/office/drawing/2014/main" id="{35754888-D47D-4F4F-BE61-0990B9E2B3B7}"/>
               </a:ext>
             </a:extLst>
           </p:cNvPr>
@@ -870,7 +985,7 @@
           <p:cNvPr id="4" name="Espaço Reservado para Data 3">
             <a:extLst>
               <a:ext uri="{FF2B5EF4-FFF2-40B4-BE49-F238E27FC236}">
-                <a16:creationId xmlns:a16="http://schemas.microsoft.com/office/drawing/2014/main" id="{1548F1B9-D89D-47EE-BBC1-B32F2000B065}"/>
+                <a16:creationId xmlns:a16="http://schemas.microsoft.com/office/drawing/2014/main" id="{EF9539F2-3CC4-41F0-A152-0956E639A081}"/>
               </a:ext>
             </a:extLst>
           </p:cNvPr>
@@ -886,11 +1001,11 @@
           <a:bodyPr/>
           <a:lstStyle/>
           <a:p>
-            <a:fld id="{48A87A34-81AB-432B-8DAE-1953F412C126}" type="datetimeFigureOut">
-              <a:rPr lang="en-US" smtClean="0"/>
-              <a:t>2/28/2021</a:t>
+            <a:fld id="{DFB1C530-B720-4979-85E3-1B39C2E0B423}" type="datetimeFigureOut">
+              <a:rPr lang="pt-BR" smtClean="0"/>
+              <a:t>09/03/2021</a:t>
             </a:fld>
-            <a:endParaRPr lang="en-US" dirty="0"/>
+            <a:endParaRPr lang="pt-BR"/>
           </a:p>
         </p:txBody>
       </p:sp>
@@ -899,7 +1014,7 @@
           <p:cNvPr id="5" name="Espaço Reservado para Rodapé 4">
             <a:extLst>
               <a:ext uri="{FF2B5EF4-FFF2-40B4-BE49-F238E27FC236}">
-                <a16:creationId xmlns:a16="http://schemas.microsoft.com/office/drawing/2014/main" id="{56533A66-C75F-48F6-8ED5-26C7781BB57E}"/>
+                <a16:creationId xmlns:a16="http://schemas.microsoft.com/office/drawing/2014/main" id="{90DE3B22-1A84-4EDA-B5FD-A1757256892D}"/>
               </a:ext>
             </a:extLst>
           </p:cNvPr>
@@ -915,7 +1030,7 @@
           <a:bodyPr/>
           <a:lstStyle/>
           <a:p>
-            <a:endParaRPr lang="en-US" dirty="0"/>
+            <a:endParaRPr lang="pt-BR"/>
           </a:p>
         </p:txBody>
       </p:sp>
@@ -924,7 +1039,7 @@
           <p:cNvPr id="6" name="Espaço Reservado para Número de Slide 5">
             <a:extLst>
               <a:ext uri="{FF2B5EF4-FFF2-40B4-BE49-F238E27FC236}">
-                <a16:creationId xmlns:a16="http://schemas.microsoft.com/office/drawing/2014/main" id="{34FE630D-5FBB-4643-8223-A8223231E5DA}"/>
+                <a16:creationId xmlns:a16="http://schemas.microsoft.com/office/drawing/2014/main" id="{9F0DCC44-7BF1-4168-B3D1-3FD5586883E3}"/>
               </a:ext>
             </a:extLst>
           </p:cNvPr>
@@ -940,18 +1055,18 @@
           <a:bodyPr/>
           <a:lstStyle/>
           <a:p>
-            <a:fld id="{6D22F896-40B5-4ADD-8801-0D06FADFA095}" type="slidenum">
-              <a:rPr lang="en-US" smtClean="0"/>
+            <a:fld id="{CFBB1475-ECF0-4314-822B-D651C560891E}" type="slidenum">
+              <a:rPr lang="pt-BR" smtClean="0"/>
               <a:t>‹nº›</a:t>
             </a:fld>
-            <a:endParaRPr lang="en-US" dirty="0"/>
+            <a:endParaRPr lang="pt-BR"/>
           </a:p>
         </p:txBody>
       </p:sp>
     </p:spTree>
     <p:extLst>
       <p:ext uri="{BB962C8B-B14F-4D97-AF65-F5344CB8AC3E}">
-        <p14:creationId xmlns:p14="http://schemas.microsoft.com/office/powerpoint/2010/main" val="1603055049"/>
+        <p14:creationId xmlns:p14="http://schemas.microsoft.com/office/powerpoint/2010/main" val="2472454364"/>
       </p:ext>
     </p:extLst>
   </p:cSld>
@@ -983,7 +1098,7 @@
           <p:cNvPr id="2" name="Título 1">
             <a:extLst>
               <a:ext uri="{FF2B5EF4-FFF2-40B4-BE49-F238E27FC236}">
-                <a16:creationId xmlns:a16="http://schemas.microsoft.com/office/drawing/2014/main" id="{968F4ED9-46E3-41AB-B2C5-93701579E1A7}"/>
+                <a16:creationId xmlns:a16="http://schemas.microsoft.com/office/drawing/2014/main" id="{E3A6A247-0B52-4A9A-BEFE-6908B8FB68F3}"/>
               </a:ext>
             </a:extLst>
           </p:cNvPr>
@@ -1020,7 +1135,7 @@
           <p:cNvPr id="3" name="Espaço Reservado para Texto 2">
             <a:extLst>
               <a:ext uri="{FF2B5EF4-FFF2-40B4-BE49-F238E27FC236}">
-                <a16:creationId xmlns:a16="http://schemas.microsoft.com/office/drawing/2014/main" id="{34ACEB8B-009B-4626-A2AB-99302D3EACAD}"/>
+                <a16:creationId xmlns:a16="http://schemas.microsoft.com/office/drawing/2014/main" id="{546F8DA6-01FA-4B8A-AF97-503AA1B6C014}"/>
               </a:ext>
             </a:extLst>
           </p:cNvPr>
@@ -1145,7 +1260,7 @@
           <p:cNvPr id="4" name="Espaço Reservado para Data 3">
             <a:extLst>
               <a:ext uri="{FF2B5EF4-FFF2-40B4-BE49-F238E27FC236}">
-                <a16:creationId xmlns:a16="http://schemas.microsoft.com/office/drawing/2014/main" id="{73D30AE1-4D96-4BD3-AADD-2AF17DD311B6}"/>
+                <a16:creationId xmlns:a16="http://schemas.microsoft.com/office/drawing/2014/main" id="{C5E3E075-122F-406C-AA2B-F5F53C18AD03}"/>
               </a:ext>
             </a:extLst>
           </p:cNvPr>
@@ -1161,11 +1276,11 @@
           <a:bodyPr/>
           <a:lstStyle/>
           <a:p>
-            <a:fld id="{48A87A34-81AB-432B-8DAE-1953F412C126}" type="datetimeFigureOut">
-              <a:rPr lang="en-US" smtClean="0"/>
-              <a:t>2/28/2021</a:t>
+            <a:fld id="{DFB1C530-B720-4979-85E3-1B39C2E0B423}" type="datetimeFigureOut">
+              <a:rPr lang="pt-BR" smtClean="0"/>
+              <a:t>09/03/2021</a:t>
             </a:fld>
-            <a:endParaRPr lang="en-US" dirty="0"/>
+            <a:endParaRPr lang="pt-BR"/>
           </a:p>
         </p:txBody>
       </p:sp>
@@ -1174,7 +1289,7 @@
           <p:cNvPr id="5" name="Espaço Reservado para Rodapé 4">
             <a:extLst>
               <a:ext uri="{FF2B5EF4-FFF2-40B4-BE49-F238E27FC236}">
-                <a16:creationId xmlns:a16="http://schemas.microsoft.com/office/drawing/2014/main" id="{82AED242-8AB1-41D8-8379-39FC9F0EE33D}"/>
+                <a16:creationId xmlns:a16="http://schemas.microsoft.com/office/drawing/2014/main" id="{99BBEE4E-3787-4D28-BEAC-F54270CB6B62}"/>
               </a:ext>
             </a:extLst>
           </p:cNvPr>
@@ -1190,7 +1305,7 @@
           <a:bodyPr/>
           <a:lstStyle/>
           <a:p>
-            <a:endParaRPr lang="en-US" dirty="0"/>
+            <a:endParaRPr lang="pt-BR"/>
           </a:p>
         </p:txBody>
       </p:sp>
@@ -1199,7 +1314,7 @@
           <p:cNvPr id="6" name="Espaço Reservado para Número de Slide 5">
             <a:extLst>
               <a:ext uri="{FF2B5EF4-FFF2-40B4-BE49-F238E27FC236}">
-                <a16:creationId xmlns:a16="http://schemas.microsoft.com/office/drawing/2014/main" id="{4FCDC079-DF0E-429C-AE66-F9E752066E45}"/>
+                <a16:creationId xmlns:a16="http://schemas.microsoft.com/office/drawing/2014/main" id="{1B033E46-277E-483F-AB02-5948A0D95FCE}"/>
               </a:ext>
             </a:extLst>
           </p:cNvPr>
@@ -1215,18 +1330,18 @@
           <a:bodyPr/>
           <a:lstStyle/>
           <a:p>
-            <a:fld id="{6D22F896-40B5-4ADD-8801-0D06FADFA095}" type="slidenum">
-              <a:rPr lang="en-US" smtClean="0"/>
+            <a:fld id="{CFBB1475-ECF0-4314-822B-D651C560891E}" type="slidenum">
+              <a:rPr lang="pt-BR" smtClean="0"/>
               <a:t>‹nº›</a:t>
             </a:fld>
-            <a:endParaRPr lang="en-US" dirty="0"/>
+            <a:endParaRPr lang="pt-BR"/>
           </a:p>
         </p:txBody>
       </p:sp>
     </p:spTree>
     <p:extLst>
       <p:ext uri="{BB962C8B-B14F-4D97-AF65-F5344CB8AC3E}">
-        <p14:creationId xmlns:p14="http://schemas.microsoft.com/office/powerpoint/2010/main" val="4120929266"/>
+        <p14:creationId xmlns:p14="http://schemas.microsoft.com/office/powerpoint/2010/main" val="1298887462"/>
       </p:ext>
     </p:extLst>
   </p:cSld>
@@ -1258,7 +1373,7 @@
           <p:cNvPr id="2" name="Título 1">
             <a:extLst>
               <a:ext uri="{FF2B5EF4-FFF2-40B4-BE49-F238E27FC236}">
-                <a16:creationId xmlns:a16="http://schemas.microsoft.com/office/drawing/2014/main" id="{48CA59CD-C605-41DA-AEC4-E8F3B043EE95}"/>
+                <a16:creationId xmlns:a16="http://schemas.microsoft.com/office/drawing/2014/main" id="{6A17A083-D0D9-4965-95F2-6C98574A137B}"/>
               </a:ext>
             </a:extLst>
           </p:cNvPr>
@@ -1286,7 +1401,7 @@
           <p:cNvPr id="3" name="Espaço Reservado para Conteúdo 2">
             <a:extLst>
               <a:ext uri="{FF2B5EF4-FFF2-40B4-BE49-F238E27FC236}">
-                <a16:creationId xmlns:a16="http://schemas.microsoft.com/office/drawing/2014/main" id="{D78CD76E-577E-4F89-BC24-D5FFA9650C84}"/>
+                <a16:creationId xmlns:a16="http://schemas.microsoft.com/office/drawing/2014/main" id="{ACED5859-CCFE-4C3A-9192-442265F71894}"/>
               </a:ext>
             </a:extLst>
           </p:cNvPr>
@@ -1348,7 +1463,7 @@
           <p:cNvPr id="4" name="Espaço Reservado para Conteúdo 3">
             <a:extLst>
               <a:ext uri="{FF2B5EF4-FFF2-40B4-BE49-F238E27FC236}">
-                <a16:creationId xmlns:a16="http://schemas.microsoft.com/office/drawing/2014/main" id="{E4BD2A8E-1BCF-47BE-9292-AE0B2110297C}"/>
+                <a16:creationId xmlns:a16="http://schemas.microsoft.com/office/drawing/2014/main" id="{F3FFDC70-79F9-4E14-9B2D-071DD54B9F63}"/>
               </a:ext>
             </a:extLst>
           </p:cNvPr>
@@ -1410,7 +1525,7 @@
           <p:cNvPr id="5" name="Espaço Reservado para Data 4">
             <a:extLst>
               <a:ext uri="{FF2B5EF4-FFF2-40B4-BE49-F238E27FC236}">
-                <a16:creationId xmlns:a16="http://schemas.microsoft.com/office/drawing/2014/main" id="{29B20DAE-E9AE-4D99-A5A6-B9055A6E6C72}"/>
+                <a16:creationId xmlns:a16="http://schemas.microsoft.com/office/drawing/2014/main" id="{8F9BDDA7-977B-4BE7-A5DE-E0BCA336B005}"/>
               </a:ext>
             </a:extLst>
           </p:cNvPr>
@@ -1426,11 +1541,11 @@
           <a:bodyPr/>
           <a:lstStyle/>
           <a:p>
-            <a:fld id="{48A87A34-81AB-432B-8DAE-1953F412C126}" type="datetimeFigureOut">
-              <a:rPr lang="en-US" smtClean="0"/>
-              <a:t>2/28/2021</a:t>
+            <a:fld id="{DFB1C530-B720-4979-85E3-1B39C2E0B423}" type="datetimeFigureOut">
+              <a:rPr lang="pt-BR" smtClean="0"/>
+              <a:t>09/03/2021</a:t>
             </a:fld>
-            <a:endParaRPr lang="en-US" dirty="0"/>
+            <a:endParaRPr lang="pt-BR"/>
           </a:p>
         </p:txBody>
       </p:sp>
@@ -1439,7 +1554,7 @@
           <p:cNvPr id="6" name="Espaço Reservado para Rodapé 5">
             <a:extLst>
               <a:ext uri="{FF2B5EF4-FFF2-40B4-BE49-F238E27FC236}">
-                <a16:creationId xmlns:a16="http://schemas.microsoft.com/office/drawing/2014/main" id="{C9489E97-3398-41EE-8D46-5A1650D2E9E5}"/>
+                <a16:creationId xmlns:a16="http://schemas.microsoft.com/office/drawing/2014/main" id="{B411945F-0A35-4248-9AC4-19A1BE9FD16E}"/>
               </a:ext>
             </a:extLst>
           </p:cNvPr>
@@ -1455,7 +1570,7 @@
           <a:bodyPr/>
           <a:lstStyle/>
           <a:p>
-            <a:endParaRPr lang="en-US" dirty="0"/>
+            <a:endParaRPr lang="pt-BR"/>
           </a:p>
         </p:txBody>
       </p:sp>
@@ -1464,7 +1579,7 @@
           <p:cNvPr id="7" name="Espaço Reservado para Número de Slide 6">
             <a:extLst>
               <a:ext uri="{FF2B5EF4-FFF2-40B4-BE49-F238E27FC236}">
-                <a16:creationId xmlns:a16="http://schemas.microsoft.com/office/drawing/2014/main" id="{5E42E238-950B-4A3E-82E2-2B5D9317AF49}"/>
+                <a16:creationId xmlns:a16="http://schemas.microsoft.com/office/drawing/2014/main" id="{6ECAC40D-8952-4646-BE8C-FB44CAF11D52}"/>
               </a:ext>
             </a:extLst>
           </p:cNvPr>
@@ -1480,18 +1595,18 @@
           <a:bodyPr/>
           <a:lstStyle/>
           <a:p>
-            <a:fld id="{6D22F896-40B5-4ADD-8801-0D06FADFA095}" type="slidenum">
-              <a:rPr lang="en-US" smtClean="0"/>
+            <a:fld id="{CFBB1475-ECF0-4314-822B-D651C560891E}" type="slidenum">
+              <a:rPr lang="pt-BR" smtClean="0"/>
               <a:t>‹nº›</a:t>
             </a:fld>
-            <a:endParaRPr lang="en-US" dirty="0"/>
+            <a:endParaRPr lang="pt-BR"/>
           </a:p>
         </p:txBody>
       </p:sp>
     </p:spTree>
     <p:extLst>
       <p:ext uri="{BB962C8B-B14F-4D97-AF65-F5344CB8AC3E}">
-        <p14:creationId xmlns:p14="http://schemas.microsoft.com/office/powerpoint/2010/main" val="354621817"/>
+        <p14:creationId xmlns:p14="http://schemas.microsoft.com/office/powerpoint/2010/main" val="2623497006"/>
       </p:ext>
     </p:extLst>
   </p:cSld>
@@ -1523,7 +1638,7 @@
           <p:cNvPr id="2" name="Título 1">
             <a:extLst>
               <a:ext uri="{FF2B5EF4-FFF2-40B4-BE49-F238E27FC236}">
-                <a16:creationId xmlns:a16="http://schemas.microsoft.com/office/drawing/2014/main" id="{3D84B892-B057-4670-9C95-4F0BA15D4B90}"/>
+                <a16:creationId xmlns:a16="http://schemas.microsoft.com/office/drawing/2014/main" id="{18E27D12-5CE5-4F1E-94A3-2EA877B2737A}"/>
               </a:ext>
             </a:extLst>
           </p:cNvPr>
@@ -1556,7 +1671,7 @@
           <p:cNvPr id="3" name="Espaço Reservado para Texto 2">
             <a:extLst>
               <a:ext uri="{FF2B5EF4-FFF2-40B4-BE49-F238E27FC236}">
-                <a16:creationId xmlns:a16="http://schemas.microsoft.com/office/drawing/2014/main" id="{4A8D293B-6B14-4A0C-8900-47E89C26C21D}"/>
+                <a16:creationId xmlns:a16="http://schemas.microsoft.com/office/drawing/2014/main" id="{190DD5C3-EB4E-43F3-B593-3530077D2E73}"/>
               </a:ext>
             </a:extLst>
           </p:cNvPr>
@@ -1627,7 +1742,7 @@
           <p:cNvPr id="4" name="Espaço Reservado para Conteúdo 3">
             <a:extLst>
               <a:ext uri="{FF2B5EF4-FFF2-40B4-BE49-F238E27FC236}">
-                <a16:creationId xmlns:a16="http://schemas.microsoft.com/office/drawing/2014/main" id="{658D5299-FF85-4338-AB82-8A003B594B19}"/>
+                <a16:creationId xmlns:a16="http://schemas.microsoft.com/office/drawing/2014/main" id="{CDE851BD-532D-42D3-AB35-37D494133C18}"/>
               </a:ext>
             </a:extLst>
           </p:cNvPr>
@@ -1689,7 +1804,7 @@
           <p:cNvPr id="5" name="Espaço Reservado para Texto 4">
             <a:extLst>
               <a:ext uri="{FF2B5EF4-FFF2-40B4-BE49-F238E27FC236}">
-                <a16:creationId xmlns:a16="http://schemas.microsoft.com/office/drawing/2014/main" id="{9C25E969-3BF7-416E-AC68-6CD1C26A37D7}"/>
+                <a16:creationId xmlns:a16="http://schemas.microsoft.com/office/drawing/2014/main" id="{06265FCD-F478-4AFF-B8FE-DDE616D9DF59}"/>
               </a:ext>
             </a:extLst>
           </p:cNvPr>
@@ -1760,7 +1875,7 @@
           <p:cNvPr id="6" name="Espaço Reservado para Conteúdo 5">
             <a:extLst>
               <a:ext uri="{FF2B5EF4-FFF2-40B4-BE49-F238E27FC236}">
-                <a16:creationId xmlns:a16="http://schemas.microsoft.com/office/drawing/2014/main" id="{A74192EF-76F6-4F15-9A2C-EAA416D60E0C}"/>
+                <a16:creationId xmlns:a16="http://schemas.microsoft.com/office/drawing/2014/main" id="{4F5FC2BA-1B9B-472E-B4BD-6F1CBAED9B83}"/>
               </a:ext>
             </a:extLst>
           </p:cNvPr>
@@ -1822,7 +1937,7 @@
           <p:cNvPr id="7" name="Espaço Reservado para Data 6">
             <a:extLst>
               <a:ext uri="{FF2B5EF4-FFF2-40B4-BE49-F238E27FC236}">
-                <a16:creationId xmlns:a16="http://schemas.microsoft.com/office/drawing/2014/main" id="{B6E4B94A-309C-4884-9080-FCCA8BDDB9D8}"/>
+                <a16:creationId xmlns:a16="http://schemas.microsoft.com/office/drawing/2014/main" id="{CDC6F7F9-0718-47D6-97E5-AEE7AD45ED7F}"/>
               </a:ext>
             </a:extLst>
           </p:cNvPr>
@@ -1838,11 +1953,11 @@
           <a:bodyPr/>
           <a:lstStyle/>
           <a:p>
-            <a:fld id="{48A87A34-81AB-432B-8DAE-1953F412C126}" type="datetimeFigureOut">
-              <a:rPr lang="en-US" smtClean="0"/>
-              <a:t>2/28/2021</a:t>
+            <a:fld id="{DFB1C530-B720-4979-85E3-1B39C2E0B423}" type="datetimeFigureOut">
+              <a:rPr lang="pt-BR" smtClean="0"/>
+              <a:t>09/03/2021</a:t>
             </a:fld>
-            <a:endParaRPr lang="en-US" dirty="0"/>
+            <a:endParaRPr lang="pt-BR"/>
           </a:p>
         </p:txBody>
       </p:sp>
@@ -1851,7 +1966,7 @@
           <p:cNvPr id="8" name="Espaço Reservado para Rodapé 7">
             <a:extLst>
               <a:ext uri="{FF2B5EF4-FFF2-40B4-BE49-F238E27FC236}">
-                <a16:creationId xmlns:a16="http://schemas.microsoft.com/office/drawing/2014/main" id="{EAA98E56-5FE4-4B76-9575-09F1FA37ED0C}"/>
+                <a16:creationId xmlns:a16="http://schemas.microsoft.com/office/drawing/2014/main" id="{E53A423B-3B92-4D87-AFF3-E403237F64DD}"/>
               </a:ext>
             </a:extLst>
           </p:cNvPr>
@@ -1867,7 +1982,7 @@
           <a:bodyPr/>
           <a:lstStyle/>
           <a:p>
-            <a:endParaRPr lang="en-US" dirty="0"/>
+            <a:endParaRPr lang="pt-BR"/>
           </a:p>
         </p:txBody>
       </p:sp>
@@ -1876,7 +1991,7 @@
           <p:cNvPr id="9" name="Espaço Reservado para Número de Slide 8">
             <a:extLst>
               <a:ext uri="{FF2B5EF4-FFF2-40B4-BE49-F238E27FC236}">
-                <a16:creationId xmlns:a16="http://schemas.microsoft.com/office/drawing/2014/main" id="{B21A6E35-2768-4823-8704-97A8630F8E7B}"/>
+                <a16:creationId xmlns:a16="http://schemas.microsoft.com/office/drawing/2014/main" id="{F280D48B-6D20-45D6-83DF-E78AD16DDA44}"/>
               </a:ext>
             </a:extLst>
           </p:cNvPr>
@@ -1892,18 +2007,18 @@
           <a:bodyPr/>
           <a:lstStyle/>
           <a:p>
-            <a:fld id="{6D22F896-40B5-4ADD-8801-0D06FADFA095}" type="slidenum">
-              <a:rPr lang="en-US" smtClean="0"/>
+            <a:fld id="{CFBB1475-ECF0-4314-822B-D651C560891E}" type="slidenum">
+              <a:rPr lang="pt-BR" smtClean="0"/>
               <a:t>‹nº›</a:t>
             </a:fld>
-            <a:endParaRPr lang="en-US" dirty="0"/>
+            <a:endParaRPr lang="pt-BR"/>
           </a:p>
         </p:txBody>
       </p:sp>
     </p:spTree>
     <p:extLst>
       <p:ext uri="{BB962C8B-B14F-4D97-AF65-F5344CB8AC3E}">
-        <p14:creationId xmlns:p14="http://schemas.microsoft.com/office/powerpoint/2010/main" val="3603060644"/>
+        <p14:creationId xmlns:p14="http://schemas.microsoft.com/office/powerpoint/2010/main" val="3350346220"/>
       </p:ext>
     </p:extLst>
   </p:cSld>
@@ -1935,7 +2050,7 @@
           <p:cNvPr id="2" name="Título 1">
             <a:extLst>
               <a:ext uri="{FF2B5EF4-FFF2-40B4-BE49-F238E27FC236}">
-                <a16:creationId xmlns:a16="http://schemas.microsoft.com/office/drawing/2014/main" id="{2D8180DA-1194-4B15-B3D5-84C10437D5F9}"/>
+                <a16:creationId xmlns:a16="http://schemas.microsoft.com/office/drawing/2014/main" id="{D8A0B211-5973-4BD9-A4F9-EFD348865A31}"/>
               </a:ext>
             </a:extLst>
           </p:cNvPr>
@@ -1963,7 +2078,7 @@
           <p:cNvPr id="3" name="Espaço Reservado para Data 2">
             <a:extLst>
               <a:ext uri="{FF2B5EF4-FFF2-40B4-BE49-F238E27FC236}">
-                <a16:creationId xmlns:a16="http://schemas.microsoft.com/office/drawing/2014/main" id="{2CBFB0DC-45B3-4931-9E9B-E4DA8A2657BA}"/>
+                <a16:creationId xmlns:a16="http://schemas.microsoft.com/office/drawing/2014/main" id="{EAD83A49-D72D-4FA5-A9CA-18399BC93AA8}"/>
               </a:ext>
             </a:extLst>
           </p:cNvPr>
@@ -1979,11 +2094,11 @@
           <a:bodyPr/>
           <a:lstStyle/>
           <a:p>
-            <a:fld id="{48A87A34-81AB-432B-8DAE-1953F412C126}" type="datetimeFigureOut">
-              <a:rPr lang="en-US" smtClean="0"/>
-              <a:t>2/28/2021</a:t>
+            <a:fld id="{DFB1C530-B720-4979-85E3-1B39C2E0B423}" type="datetimeFigureOut">
+              <a:rPr lang="pt-BR" smtClean="0"/>
+              <a:t>09/03/2021</a:t>
             </a:fld>
-            <a:endParaRPr lang="en-US" dirty="0"/>
+            <a:endParaRPr lang="pt-BR"/>
           </a:p>
         </p:txBody>
       </p:sp>
@@ -1992,7 +2107,7 @@
           <p:cNvPr id="4" name="Espaço Reservado para Rodapé 3">
             <a:extLst>
               <a:ext uri="{FF2B5EF4-FFF2-40B4-BE49-F238E27FC236}">
-                <a16:creationId xmlns:a16="http://schemas.microsoft.com/office/drawing/2014/main" id="{E6A239E1-CFB3-4EFE-99E4-7E13B847974C}"/>
+                <a16:creationId xmlns:a16="http://schemas.microsoft.com/office/drawing/2014/main" id="{FB4A9435-5717-45D0-9884-0979395395F7}"/>
               </a:ext>
             </a:extLst>
           </p:cNvPr>
@@ -2008,7 +2123,7 @@
           <a:bodyPr/>
           <a:lstStyle/>
           <a:p>
-            <a:endParaRPr lang="en-US" dirty="0"/>
+            <a:endParaRPr lang="pt-BR"/>
           </a:p>
         </p:txBody>
       </p:sp>
@@ -2017,7 +2132,7 @@
           <p:cNvPr id="5" name="Espaço Reservado para Número de Slide 4">
             <a:extLst>
               <a:ext uri="{FF2B5EF4-FFF2-40B4-BE49-F238E27FC236}">
-                <a16:creationId xmlns:a16="http://schemas.microsoft.com/office/drawing/2014/main" id="{8778DB98-0E7B-4253-A6C3-31644777F3F7}"/>
+                <a16:creationId xmlns:a16="http://schemas.microsoft.com/office/drawing/2014/main" id="{D5C82AA0-451F-418A-B0B2-7C58B3830F94}"/>
               </a:ext>
             </a:extLst>
           </p:cNvPr>
@@ -2033,18 +2148,18 @@
           <a:bodyPr/>
           <a:lstStyle/>
           <a:p>
-            <a:fld id="{6D22F896-40B5-4ADD-8801-0D06FADFA095}" type="slidenum">
-              <a:rPr lang="en-US" smtClean="0"/>
+            <a:fld id="{CFBB1475-ECF0-4314-822B-D651C560891E}" type="slidenum">
+              <a:rPr lang="pt-BR" smtClean="0"/>
               <a:t>‹nº›</a:t>
             </a:fld>
-            <a:endParaRPr lang="en-US" dirty="0"/>
+            <a:endParaRPr lang="pt-BR"/>
           </a:p>
         </p:txBody>
       </p:sp>
     </p:spTree>
     <p:extLst>
       <p:ext uri="{BB962C8B-B14F-4D97-AF65-F5344CB8AC3E}">
-        <p14:creationId xmlns:p14="http://schemas.microsoft.com/office/powerpoint/2010/main" val="3935578975"/>
+        <p14:creationId xmlns:p14="http://schemas.microsoft.com/office/powerpoint/2010/main" val="2591899812"/>
       </p:ext>
     </p:extLst>
   </p:cSld>
@@ -2076,7 +2191,7 @@
           <p:cNvPr id="2" name="Espaço Reservado para Data 1">
             <a:extLst>
               <a:ext uri="{FF2B5EF4-FFF2-40B4-BE49-F238E27FC236}">
-                <a16:creationId xmlns:a16="http://schemas.microsoft.com/office/drawing/2014/main" id="{85D3CB3F-815D-4370-A2AF-AA813CCAD5C1}"/>
+                <a16:creationId xmlns:a16="http://schemas.microsoft.com/office/drawing/2014/main" id="{1224D334-3C60-4685-ABBB-8AF12B5D766B}"/>
               </a:ext>
             </a:extLst>
           </p:cNvPr>
@@ -2092,11 +2207,11 @@
           <a:bodyPr/>
           <a:lstStyle/>
           <a:p>
-            <a:fld id="{48A87A34-81AB-432B-8DAE-1953F412C126}" type="datetimeFigureOut">
-              <a:rPr lang="en-US" smtClean="0"/>
-              <a:t>2/28/2021</a:t>
+            <a:fld id="{DFB1C530-B720-4979-85E3-1B39C2E0B423}" type="datetimeFigureOut">
+              <a:rPr lang="pt-BR" smtClean="0"/>
+              <a:t>09/03/2021</a:t>
             </a:fld>
-            <a:endParaRPr lang="en-US" dirty="0"/>
+            <a:endParaRPr lang="pt-BR"/>
           </a:p>
         </p:txBody>
       </p:sp>
@@ -2105,7 +2220,7 @@
           <p:cNvPr id="3" name="Espaço Reservado para Rodapé 2">
             <a:extLst>
               <a:ext uri="{FF2B5EF4-FFF2-40B4-BE49-F238E27FC236}">
-                <a16:creationId xmlns:a16="http://schemas.microsoft.com/office/drawing/2014/main" id="{D8577BB0-7459-45D0-81C3-2BB5177DBDE2}"/>
+                <a16:creationId xmlns:a16="http://schemas.microsoft.com/office/drawing/2014/main" id="{0598E360-D35D-484A-9DEA-D9DBC482C3F5}"/>
               </a:ext>
             </a:extLst>
           </p:cNvPr>
@@ -2121,7 +2236,7 @@
           <a:bodyPr/>
           <a:lstStyle/>
           <a:p>
-            <a:endParaRPr lang="en-US" dirty="0"/>
+            <a:endParaRPr lang="pt-BR"/>
           </a:p>
         </p:txBody>
       </p:sp>
@@ -2130,7 +2245,7 @@
           <p:cNvPr id="4" name="Espaço Reservado para Número de Slide 3">
             <a:extLst>
               <a:ext uri="{FF2B5EF4-FFF2-40B4-BE49-F238E27FC236}">
-                <a16:creationId xmlns:a16="http://schemas.microsoft.com/office/drawing/2014/main" id="{D6621A90-AC4D-4BF4-BDCF-6598AEB202EA}"/>
+                <a16:creationId xmlns:a16="http://schemas.microsoft.com/office/drawing/2014/main" id="{52916A78-D2F2-4847-BA50-2118842EBE04}"/>
               </a:ext>
             </a:extLst>
           </p:cNvPr>
@@ -2146,18 +2261,18 @@
           <a:bodyPr/>
           <a:lstStyle/>
           <a:p>
-            <a:fld id="{6D22F896-40B5-4ADD-8801-0D06FADFA095}" type="slidenum">
-              <a:rPr lang="en-US" smtClean="0"/>
+            <a:fld id="{CFBB1475-ECF0-4314-822B-D651C560891E}" type="slidenum">
+              <a:rPr lang="pt-BR" smtClean="0"/>
               <a:t>‹nº›</a:t>
             </a:fld>
-            <a:endParaRPr lang="en-US" dirty="0"/>
+            <a:endParaRPr lang="pt-BR"/>
           </a:p>
         </p:txBody>
       </p:sp>
     </p:spTree>
     <p:extLst>
       <p:ext uri="{BB962C8B-B14F-4D97-AF65-F5344CB8AC3E}">
-        <p14:creationId xmlns:p14="http://schemas.microsoft.com/office/powerpoint/2010/main" val="2445517659"/>
+        <p14:creationId xmlns:p14="http://schemas.microsoft.com/office/powerpoint/2010/main" val="2195177015"/>
       </p:ext>
     </p:extLst>
   </p:cSld>
@@ -2189,7 +2304,7 @@
           <p:cNvPr id="2" name="Título 1">
             <a:extLst>
               <a:ext uri="{FF2B5EF4-FFF2-40B4-BE49-F238E27FC236}">
-                <a16:creationId xmlns:a16="http://schemas.microsoft.com/office/drawing/2014/main" id="{41F28E8E-6ABB-45DD-828C-A0728ADA01C5}"/>
+                <a16:creationId xmlns:a16="http://schemas.microsoft.com/office/drawing/2014/main" id="{E49F91B9-EFA4-46E1-BAD9-9211053F3AAC}"/>
               </a:ext>
             </a:extLst>
           </p:cNvPr>
@@ -2226,7 +2341,7 @@
           <p:cNvPr id="3" name="Espaço Reservado para Conteúdo 2">
             <a:extLst>
               <a:ext uri="{FF2B5EF4-FFF2-40B4-BE49-F238E27FC236}">
-                <a16:creationId xmlns:a16="http://schemas.microsoft.com/office/drawing/2014/main" id="{28EC5080-F8F6-470D-8FAA-6AD39FBF96AE}"/>
+                <a16:creationId xmlns:a16="http://schemas.microsoft.com/office/drawing/2014/main" id="{FA6CB9B2-B72E-4805-B06A-58A805267946}"/>
               </a:ext>
             </a:extLst>
           </p:cNvPr>
@@ -2316,7 +2431,7 @@
           <p:cNvPr id="4" name="Espaço Reservado para Texto 3">
             <a:extLst>
               <a:ext uri="{FF2B5EF4-FFF2-40B4-BE49-F238E27FC236}">
-                <a16:creationId xmlns:a16="http://schemas.microsoft.com/office/drawing/2014/main" id="{BC4490E1-4626-4244-9F86-8C29FC3CC86C}"/>
+                <a16:creationId xmlns:a16="http://schemas.microsoft.com/office/drawing/2014/main" id="{D46E8241-8408-4BB6-97E8-EF5FE7E27EB1}"/>
               </a:ext>
             </a:extLst>
           </p:cNvPr>
@@ -2387,7 +2502,7 @@
           <p:cNvPr id="5" name="Espaço Reservado para Data 4">
             <a:extLst>
               <a:ext uri="{FF2B5EF4-FFF2-40B4-BE49-F238E27FC236}">
-                <a16:creationId xmlns:a16="http://schemas.microsoft.com/office/drawing/2014/main" id="{EC753926-F010-4F45-9DBE-850BDC5B732C}"/>
+                <a16:creationId xmlns:a16="http://schemas.microsoft.com/office/drawing/2014/main" id="{177F11BC-632B-413E-AAFA-7233348A441F}"/>
               </a:ext>
             </a:extLst>
           </p:cNvPr>
@@ -2403,11 +2518,11 @@
           <a:bodyPr/>
           <a:lstStyle/>
           <a:p>
-            <a:fld id="{48A87A34-81AB-432B-8DAE-1953F412C126}" type="datetimeFigureOut">
-              <a:rPr lang="en-US" smtClean="0"/>
-              <a:t>2/28/2021</a:t>
+            <a:fld id="{DFB1C530-B720-4979-85E3-1B39C2E0B423}" type="datetimeFigureOut">
+              <a:rPr lang="pt-BR" smtClean="0"/>
+              <a:t>09/03/2021</a:t>
             </a:fld>
-            <a:endParaRPr lang="en-US" dirty="0"/>
+            <a:endParaRPr lang="pt-BR"/>
           </a:p>
         </p:txBody>
       </p:sp>
@@ -2416,7 +2531,7 @@
           <p:cNvPr id="6" name="Espaço Reservado para Rodapé 5">
             <a:extLst>
               <a:ext uri="{FF2B5EF4-FFF2-40B4-BE49-F238E27FC236}">
-                <a16:creationId xmlns:a16="http://schemas.microsoft.com/office/drawing/2014/main" id="{682249F2-D707-4C52-BB02-7891F336343A}"/>
+                <a16:creationId xmlns:a16="http://schemas.microsoft.com/office/drawing/2014/main" id="{1D845699-70B6-4032-8E19-61A7FA1C5924}"/>
               </a:ext>
             </a:extLst>
           </p:cNvPr>
@@ -2432,7 +2547,7 @@
           <a:bodyPr/>
           <a:lstStyle/>
           <a:p>
-            <a:endParaRPr lang="en-US" dirty="0"/>
+            <a:endParaRPr lang="pt-BR"/>
           </a:p>
         </p:txBody>
       </p:sp>
@@ -2441,7 +2556,7 @@
           <p:cNvPr id="7" name="Espaço Reservado para Número de Slide 6">
             <a:extLst>
               <a:ext uri="{FF2B5EF4-FFF2-40B4-BE49-F238E27FC236}">
-                <a16:creationId xmlns:a16="http://schemas.microsoft.com/office/drawing/2014/main" id="{5FCF0E56-C023-43E6-A0F7-5F0D35C6E918}"/>
+                <a16:creationId xmlns:a16="http://schemas.microsoft.com/office/drawing/2014/main" id="{A65E4988-8745-4F89-8DD7-CD306F3B0F0F}"/>
               </a:ext>
             </a:extLst>
           </p:cNvPr>
@@ -2457,18 +2572,18 @@
           <a:bodyPr/>
           <a:lstStyle/>
           <a:p>
-            <a:fld id="{6D22F896-40B5-4ADD-8801-0D06FADFA095}" type="slidenum">
-              <a:rPr lang="en-US" smtClean="0"/>
+            <a:fld id="{CFBB1475-ECF0-4314-822B-D651C560891E}" type="slidenum">
+              <a:rPr lang="pt-BR" smtClean="0"/>
               <a:t>‹nº›</a:t>
             </a:fld>
-            <a:endParaRPr lang="en-US" dirty="0"/>
+            <a:endParaRPr lang="pt-BR"/>
           </a:p>
         </p:txBody>
       </p:sp>
     </p:spTree>
     <p:extLst>
       <p:ext uri="{BB962C8B-B14F-4D97-AF65-F5344CB8AC3E}">
-        <p14:creationId xmlns:p14="http://schemas.microsoft.com/office/powerpoint/2010/main" val="219750152"/>
+        <p14:creationId xmlns:p14="http://schemas.microsoft.com/office/powerpoint/2010/main" val="3374172145"/>
       </p:ext>
     </p:extLst>
   </p:cSld>
@@ -2500,7 +2615,7 @@
           <p:cNvPr id="2" name="Título 1">
             <a:extLst>
               <a:ext uri="{FF2B5EF4-FFF2-40B4-BE49-F238E27FC236}">
-                <a16:creationId xmlns:a16="http://schemas.microsoft.com/office/drawing/2014/main" id="{DCED3B5E-A323-456A-AFD0-5FA90744E2AE}"/>
+                <a16:creationId xmlns:a16="http://schemas.microsoft.com/office/drawing/2014/main" id="{3203BA8C-26F1-429D-B6AA-4FA9E929C0C1}"/>
               </a:ext>
             </a:extLst>
           </p:cNvPr>
@@ -2537,7 +2652,7 @@
           <p:cNvPr id="3" name="Espaço Reservado para Imagem 2">
             <a:extLst>
               <a:ext uri="{FF2B5EF4-FFF2-40B4-BE49-F238E27FC236}">
-                <a16:creationId xmlns:a16="http://schemas.microsoft.com/office/drawing/2014/main" id="{A1B9AE30-9D60-45EF-B2FA-95221018821E}"/>
+                <a16:creationId xmlns:a16="http://schemas.microsoft.com/office/drawing/2014/main" id="{1D4D374D-D954-4E9A-B7B2-6F82A7CE6BDE}"/>
               </a:ext>
             </a:extLst>
           </p:cNvPr>
@@ -2604,7 +2719,7 @@
           <p:cNvPr id="4" name="Espaço Reservado para Texto 3">
             <a:extLst>
               <a:ext uri="{FF2B5EF4-FFF2-40B4-BE49-F238E27FC236}">
-                <a16:creationId xmlns:a16="http://schemas.microsoft.com/office/drawing/2014/main" id="{483FA2CF-D942-4693-A4C1-999A8C8FD8FC}"/>
+                <a16:creationId xmlns:a16="http://schemas.microsoft.com/office/drawing/2014/main" id="{769E40C6-0321-45EC-8E21-BB7E4D72E6BF}"/>
               </a:ext>
             </a:extLst>
           </p:cNvPr>
@@ -2675,7 +2790,7 @@
           <p:cNvPr id="5" name="Espaço Reservado para Data 4">
             <a:extLst>
               <a:ext uri="{FF2B5EF4-FFF2-40B4-BE49-F238E27FC236}">
-                <a16:creationId xmlns:a16="http://schemas.microsoft.com/office/drawing/2014/main" id="{D3C20224-320D-42E9-BA18-523DAE09F898}"/>
+                <a16:creationId xmlns:a16="http://schemas.microsoft.com/office/drawing/2014/main" id="{2E9D988C-3002-40E9-880F-E8A0EDD4A3A5}"/>
               </a:ext>
             </a:extLst>
           </p:cNvPr>
@@ -2691,11 +2806,11 @@
           <a:bodyPr/>
           <a:lstStyle/>
           <a:p>
-            <a:fld id="{48A87A34-81AB-432B-8DAE-1953F412C126}" type="datetimeFigureOut">
-              <a:rPr lang="en-US" smtClean="0"/>
-              <a:t>2/28/2021</a:t>
+            <a:fld id="{DFB1C530-B720-4979-85E3-1B39C2E0B423}" type="datetimeFigureOut">
+              <a:rPr lang="pt-BR" smtClean="0"/>
+              <a:t>09/03/2021</a:t>
             </a:fld>
-            <a:endParaRPr lang="en-US" dirty="0"/>
+            <a:endParaRPr lang="pt-BR"/>
           </a:p>
         </p:txBody>
       </p:sp>
@@ -2704,7 +2819,7 @@
           <p:cNvPr id="6" name="Espaço Reservado para Rodapé 5">
             <a:extLst>
               <a:ext uri="{FF2B5EF4-FFF2-40B4-BE49-F238E27FC236}">
-                <a16:creationId xmlns:a16="http://schemas.microsoft.com/office/drawing/2014/main" id="{A3BA8E99-10D9-4D66-9F6E-7B14B4EBBFF5}"/>
+                <a16:creationId xmlns:a16="http://schemas.microsoft.com/office/drawing/2014/main" id="{EBB8F45E-7B30-4CEB-BB14-A7562B051ED7}"/>
               </a:ext>
             </a:extLst>
           </p:cNvPr>
@@ -2720,7 +2835,7 @@
           <a:bodyPr/>
           <a:lstStyle/>
           <a:p>
-            <a:endParaRPr lang="en-US" dirty="0"/>
+            <a:endParaRPr lang="pt-BR"/>
           </a:p>
         </p:txBody>
       </p:sp>
@@ -2729,7 +2844,7 @@
           <p:cNvPr id="7" name="Espaço Reservado para Número de Slide 6">
             <a:extLst>
               <a:ext uri="{FF2B5EF4-FFF2-40B4-BE49-F238E27FC236}">
-                <a16:creationId xmlns:a16="http://schemas.microsoft.com/office/drawing/2014/main" id="{AA6E8D87-B7D1-40FA-9BB0-724DD96D2F87}"/>
+                <a16:creationId xmlns:a16="http://schemas.microsoft.com/office/drawing/2014/main" id="{310458CE-DB01-426A-880E-AFE48ED245F0}"/>
               </a:ext>
             </a:extLst>
           </p:cNvPr>
@@ -2745,18 +2860,18 @@
           <a:bodyPr/>
           <a:lstStyle/>
           <a:p>
-            <a:fld id="{6D22F896-40B5-4ADD-8801-0D06FADFA095}" type="slidenum">
-              <a:rPr lang="en-US" smtClean="0"/>
+            <a:fld id="{CFBB1475-ECF0-4314-822B-D651C560891E}" type="slidenum">
+              <a:rPr lang="pt-BR" smtClean="0"/>
               <a:t>‹nº›</a:t>
             </a:fld>
-            <a:endParaRPr lang="en-US" dirty="0"/>
+            <a:endParaRPr lang="pt-BR"/>
           </a:p>
         </p:txBody>
       </p:sp>
     </p:spTree>
     <p:extLst>
       <p:ext uri="{BB962C8B-B14F-4D97-AF65-F5344CB8AC3E}">
-        <p14:creationId xmlns:p14="http://schemas.microsoft.com/office/powerpoint/2010/main" val="1718076562"/>
+        <p14:creationId xmlns:p14="http://schemas.microsoft.com/office/powerpoint/2010/main" val="3091000100"/>
       </p:ext>
     </p:extLst>
   </p:cSld>
@@ -2793,7 +2908,7 @@
           <p:cNvPr id="2" name="Espaço Reservado para Título 1">
             <a:extLst>
               <a:ext uri="{FF2B5EF4-FFF2-40B4-BE49-F238E27FC236}">
-                <a16:creationId xmlns:a16="http://schemas.microsoft.com/office/drawing/2014/main" id="{C9909485-EB07-4C89-A14D-3C1231E1CDED}"/>
+                <a16:creationId xmlns:a16="http://schemas.microsoft.com/office/drawing/2014/main" id="{A634B7DF-B371-4DDC-B978-139610AA3454}"/>
               </a:ext>
             </a:extLst>
           </p:cNvPr>
@@ -2831,7 +2946,7 @@
           <p:cNvPr id="3" name="Espaço Reservado para Texto 2">
             <a:extLst>
               <a:ext uri="{FF2B5EF4-FFF2-40B4-BE49-F238E27FC236}">
-                <a16:creationId xmlns:a16="http://schemas.microsoft.com/office/drawing/2014/main" id="{2D098BD1-4A3F-4CA3-9A9D-F14EC90D6B1C}"/>
+                <a16:creationId xmlns:a16="http://schemas.microsoft.com/office/drawing/2014/main" id="{9664C204-F189-4AEB-888C-0A8621EF8EE3}"/>
               </a:ext>
             </a:extLst>
           </p:cNvPr>
@@ -2898,7 +3013,7 @@
           <p:cNvPr id="4" name="Espaço Reservado para Data 3">
             <a:extLst>
               <a:ext uri="{FF2B5EF4-FFF2-40B4-BE49-F238E27FC236}">
-                <a16:creationId xmlns:a16="http://schemas.microsoft.com/office/drawing/2014/main" id="{955C4818-71B4-4AF6-957A-958D28CEDE0A}"/>
+                <a16:creationId xmlns:a16="http://schemas.microsoft.com/office/drawing/2014/main" id="{062181F2-FEB0-4E16-9252-45B2CFF9E026}"/>
               </a:ext>
             </a:extLst>
           </p:cNvPr>
@@ -2932,12 +3047,11 @@
             </a:lvl1pPr>
           </a:lstStyle>
           <a:p>
-            <a:fld id="{48A87A34-81AB-432B-8DAE-1953F412C126}" type="datetimeFigureOut">
-              <a:rPr lang="en-US" smtClean="0"/>
-              <a:pPr/>
-              <a:t>2/28/2021</a:t>
+            <a:fld id="{DFB1C530-B720-4979-85E3-1B39C2E0B423}" type="datetimeFigureOut">
+              <a:rPr lang="pt-BR" smtClean="0"/>
+              <a:t>09/03/2021</a:t>
             </a:fld>
-            <a:endParaRPr lang="en-US" dirty="0"/>
+            <a:endParaRPr lang="pt-BR"/>
           </a:p>
         </p:txBody>
       </p:sp>
@@ -2946,7 +3060,7 @@
           <p:cNvPr id="5" name="Espaço Reservado para Rodapé 4">
             <a:extLst>
               <a:ext uri="{FF2B5EF4-FFF2-40B4-BE49-F238E27FC236}">
-                <a16:creationId xmlns:a16="http://schemas.microsoft.com/office/drawing/2014/main" id="{A530DBA4-955B-4BE6-9CD1-1B0BBD27D3A8}"/>
+                <a16:creationId xmlns:a16="http://schemas.microsoft.com/office/drawing/2014/main" id="{D4BE7BB0-7DA9-49C9-A9F9-232FAFFE463F}"/>
               </a:ext>
             </a:extLst>
           </p:cNvPr>
@@ -2980,7 +3094,7 @@
             </a:lvl1pPr>
           </a:lstStyle>
           <a:p>
-            <a:endParaRPr lang="en-US" dirty="0"/>
+            <a:endParaRPr lang="pt-BR"/>
           </a:p>
         </p:txBody>
       </p:sp>
@@ -2989,7 +3103,7 @@
           <p:cNvPr id="6" name="Espaço Reservado para Número de Slide 5">
             <a:extLst>
               <a:ext uri="{FF2B5EF4-FFF2-40B4-BE49-F238E27FC236}">
-                <a16:creationId xmlns:a16="http://schemas.microsoft.com/office/drawing/2014/main" id="{6CB0769E-5434-4A2E-A740-5CE8749A8D51}"/>
+                <a16:creationId xmlns:a16="http://schemas.microsoft.com/office/drawing/2014/main" id="{ED196CD2-FA51-4BB3-9622-EA81A98EC0E2}"/>
               </a:ext>
             </a:extLst>
           </p:cNvPr>
@@ -3023,35 +3137,34 @@
             </a:lvl1pPr>
           </a:lstStyle>
           <a:p>
-            <a:fld id="{6D22F896-40B5-4ADD-8801-0D06FADFA095}" type="slidenum">
-              <a:rPr lang="en-US" smtClean="0"/>
-              <a:pPr/>
+            <a:fld id="{CFBB1475-ECF0-4314-822B-D651C560891E}" type="slidenum">
+              <a:rPr lang="pt-BR" smtClean="0"/>
               <a:t>‹nº›</a:t>
             </a:fld>
-            <a:endParaRPr lang="en-US" dirty="0"/>
+            <a:endParaRPr lang="pt-BR"/>
           </a:p>
         </p:txBody>
       </p:sp>
     </p:spTree>
     <p:extLst>
       <p:ext uri="{BB962C8B-B14F-4D97-AF65-F5344CB8AC3E}">
-        <p14:creationId xmlns:p14="http://schemas.microsoft.com/office/powerpoint/2010/main" val="1688618303"/>
+        <p14:creationId xmlns:p14="http://schemas.microsoft.com/office/powerpoint/2010/main" val="1927785829"/>
       </p:ext>
     </p:extLst>
   </p:cSld>
   <p:clrMap bg1="lt1" tx1="dk1" bg2="lt2" tx2="dk2" accent1="accent1" accent2="accent2" accent3="accent3" accent4="accent4" accent5="accent5" accent6="accent6" hlink="hlink" folHlink="folHlink"/>
   <p:sldLayoutIdLst>
-    <p:sldLayoutId id="2147483682" r:id="rId1"/>
-    <p:sldLayoutId id="2147483683" r:id="rId2"/>
-    <p:sldLayoutId id="2147483684" r:id="rId3"/>
-    <p:sldLayoutId id="2147483685" r:id="rId4"/>
-    <p:sldLayoutId id="2147483686" r:id="rId5"/>
-    <p:sldLayoutId id="2147483687" r:id="rId6"/>
-    <p:sldLayoutId id="2147483688" r:id="rId7"/>
-    <p:sldLayoutId id="2147483689" r:id="rId8"/>
-    <p:sldLayoutId id="2147483690" r:id="rId9"/>
-    <p:sldLayoutId id="2147483691" r:id="rId10"/>
-    <p:sldLayoutId id="2147483692" r:id="rId11"/>
+    <p:sldLayoutId id="2147483649" r:id="rId1"/>
+    <p:sldLayoutId id="2147483650" r:id="rId2"/>
+    <p:sldLayoutId id="2147483651" r:id="rId3"/>
+    <p:sldLayoutId id="2147483652" r:id="rId4"/>
+    <p:sldLayoutId id="2147483653" r:id="rId5"/>
+    <p:sldLayoutId id="2147483654" r:id="rId6"/>
+    <p:sldLayoutId id="2147483655" r:id="rId7"/>
+    <p:sldLayoutId id="2147483656" r:id="rId8"/>
+    <p:sldLayoutId id="2147483657" r:id="rId9"/>
+    <p:sldLayoutId id="2147483658" r:id="rId10"/>
+    <p:sldLayoutId id="2147483659" r:id="rId11"/>
   </p:sldLayoutIdLst>
   <p:txStyles>
     <p:titleStyle>
@@ -9006,6 +9119,69 @@
 </p:sld>
 </file>
 
+<file path=ppt/slides/slide27.xml><?xml version="1.0" encoding="utf-8"?>
+<p:sld xmlns:a="http://schemas.openxmlformats.org/drawingml/2006/main" xmlns:r="http://schemas.openxmlformats.org/officeDocument/2006/relationships" xmlns:p="http://schemas.openxmlformats.org/presentationml/2006/main">
+  <p:cSld>
+    <p:spTree>
+      <p:nvGrpSpPr>
+        <p:cNvPr id="1" name=""/>
+        <p:cNvGrpSpPr/>
+        <p:nvPr/>
+      </p:nvGrpSpPr>
+      <p:grpSpPr>
+        <a:xfrm>
+          <a:off x="0" y="0"/>
+          <a:ext cx="0" cy="0"/>
+          <a:chOff x="0" y="0"/>
+          <a:chExt cx="0" cy="0"/>
+        </a:xfrm>
+      </p:grpSpPr>
+      <p:sp>
+        <p:nvSpPr>
+          <p:cNvPr id="4" name="Título 3">
+            <a:extLst>
+              <a:ext uri="{FF2B5EF4-FFF2-40B4-BE49-F238E27FC236}">
+                <a16:creationId xmlns:a16="http://schemas.microsoft.com/office/drawing/2014/main" id="{4B7820EE-BCAA-4ABB-8F7C-85DF55482910}"/>
+              </a:ext>
+            </a:extLst>
+          </p:cNvPr>
+          <p:cNvSpPr>
+            <a:spLocks noGrp="1"/>
+          </p:cNvSpPr>
+          <p:nvPr>
+            <p:ph type="ctrTitle"/>
+          </p:nvPr>
+        </p:nvSpPr>
+        <p:spPr>
+          <a:xfrm>
+            <a:off x="1229622" y="1808163"/>
+            <a:ext cx="9144000" cy="2387600"/>
+          </a:xfrm>
+        </p:spPr>
+        <p:txBody>
+          <a:bodyPr/>
+          <a:lstStyle/>
+          <a:p>
+            <a:r>
+              <a:rPr lang="pt-BR" dirty="0"/>
+              <a:t>Obrigado!</a:t>
+            </a:r>
+          </a:p>
+        </p:txBody>
+      </p:sp>
+    </p:spTree>
+    <p:extLst>
+      <p:ext uri="{BB962C8B-B14F-4D97-AF65-F5344CB8AC3E}">
+        <p14:creationId xmlns:p14="http://schemas.microsoft.com/office/powerpoint/2010/main" val="1019569165"/>
+      </p:ext>
+    </p:extLst>
+  </p:cSld>
+  <p:clrMapOvr>
+    <a:masterClrMapping/>
+  </p:clrMapOvr>
+</p:sld>
+</file>
+
 <file path=ppt/slides/slide3.xml><?xml version="1.0" encoding="utf-8"?>
 <p:sld xmlns:a="http://schemas.openxmlformats.org/drawingml/2006/main" xmlns:r="http://schemas.openxmlformats.org/officeDocument/2006/relationships" xmlns:p="http://schemas.openxmlformats.org/presentationml/2006/main">
   <p:cSld>
@@ -9075,7 +9251,7 @@
         </p:spPr>
         <p:txBody>
           <a:bodyPr>
-            <a:normAutofit fontScale="92500"/>
+            <a:normAutofit/>
           </a:bodyPr>
           <a:lstStyle/>
           <a:p>
@@ -9096,54 +9272,7 @@
             <a:pPr algn="just"/>
             <a:r>
               <a:rPr lang="pt-BR" dirty="0"/>
-              <a:t>Esses impactos são destacados e tratados em artigos acadêmicos como o de </a:t>
-            </a:r>
-            <a:r>
-              <a:rPr lang="pt-BR" dirty="0" err="1"/>
-              <a:t>Verner</a:t>
-            </a:r>
-            <a:r>
-              <a:rPr lang="pt-BR" dirty="0"/>
-              <a:t>, </a:t>
-            </a:r>
-            <a:r>
-              <a:rPr lang="pt-BR" dirty="0" err="1"/>
-              <a:t>Sampson</a:t>
-            </a:r>
-            <a:r>
-              <a:rPr lang="pt-BR" dirty="0"/>
-              <a:t> e </a:t>
-            </a:r>
-            <a:r>
-              <a:rPr lang="pt-BR" dirty="0" err="1"/>
-              <a:t>Cerpa</a:t>
-            </a:r>
-            <a:r>
-              <a:rPr lang="pt-BR" dirty="0"/>
-              <a:t> (2008) e </a:t>
-            </a:r>
-            <a:r>
-              <a:rPr lang="pt-BR" dirty="0" err="1"/>
-              <a:t>Lehtinen</a:t>
-            </a:r>
-            <a:r>
-              <a:rPr lang="pt-BR" dirty="0"/>
-              <a:t> (2014); análises como a realizada pelo PMI (2013) e o estudo realizado por Hinds e </a:t>
-            </a:r>
-            <a:r>
-              <a:rPr lang="pt-BR" dirty="0" err="1"/>
-              <a:t>Bailey</a:t>
-            </a:r>
-            <a:r>
-              <a:rPr lang="pt-BR" dirty="0"/>
-              <a:t> (2003)</a:t>
-            </a:r>
-          </a:p>
-          <a:p>
-            <a:pPr algn="just"/>
-            <a:r>
-              <a:rPr lang="pt-BR" dirty="0"/>
-              <a:t>A motivação do trabalho é propor uma solução para estes problemas, destacados nas referências citadas e percebidos em projetos no qual houve a participação do autor</a:t>
+              <a:t>A motivação do trabalho é propor uma solução para estes problemas, destacados em artigos acadêmicos e percebidos em projetos no qual houve a participação do autor, cujos impactos resultaram em retrabalhos e comprometeram prazos e custos de projetos</a:t>
             </a:r>
           </a:p>
         </p:txBody>
@@ -9471,7 +9600,7 @@
             </a:pPr>
             <a:r>
               <a:rPr lang="pt-BR" dirty="0"/>
-              <a:t>Levantamento bibliográfico e estudo de materiais relacionados aos tema</a:t>
+              <a:t>Levantamento bibliográfico e estudo de materiais relacionados ao tema</a:t>
             </a:r>
           </a:p>
           <a:p>
@@ -9566,16 +9695,6 @@
 <file path=ppt/slides/slide6.xml><?xml version="1.0" encoding="utf-8"?>
 <p:sld xmlns:a="http://schemas.openxmlformats.org/drawingml/2006/main" xmlns:r="http://schemas.openxmlformats.org/officeDocument/2006/relationships" xmlns:p="http://schemas.openxmlformats.org/presentationml/2006/main">
   <p:cSld>
-    <p:bg>
-      <p:bgPr>
-        <a:solidFill>
-          <a:schemeClr val="accent1">
-            <a:alpha val="0"/>
-          </a:schemeClr>
-        </a:solidFill>
-        <a:effectLst/>
-      </p:bgPr>
-    </p:bg>
     <p:spTree>
       <p:nvGrpSpPr>
         <p:cNvPr id="1" name=""/>
@@ -9592,10 +9711,187 @@
       </p:grpSpPr>
       <p:sp>
         <p:nvSpPr>
-          <p:cNvPr id="27" name="Retângulo 26">
-            <a:extLst>
-              <a:ext uri="{FF2B5EF4-FFF2-40B4-BE49-F238E27FC236}">
-                <a16:creationId xmlns:a16="http://schemas.microsoft.com/office/drawing/2014/main" id="{AB7B73A2-0C0A-4F72-B508-36F3389860CA}"/>
+          <p:cNvPr id="2" name="Título 1">
+            <a:extLst>
+              <a:ext uri="{FF2B5EF4-FFF2-40B4-BE49-F238E27FC236}">
+                <a16:creationId xmlns:a16="http://schemas.microsoft.com/office/drawing/2014/main" id="{FFA53715-4976-42BB-9FE5-889E0A122931}"/>
+              </a:ext>
+            </a:extLst>
+          </p:cNvPr>
+          <p:cNvSpPr>
+            <a:spLocks noGrp="1"/>
+          </p:cNvSpPr>
+          <p:nvPr>
+            <p:ph type="title"/>
+          </p:nvPr>
+        </p:nvSpPr>
+        <p:spPr/>
+        <p:txBody>
+          <a:bodyPr>
+            <a:noAutofit/>
+          </a:bodyPr>
+          <a:lstStyle/>
+          <a:p>
+            <a:r>
+              <a:rPr lang="pt-BR" sz="3600" dirty="0"/>
+              <a:t>    </a:t>
+            </a:r>
+            <a:br>
+              <a:rPr lang="pt-BR" sz="3600" dirty="0"/>
+            </a:br>
+            <a:r>
+              <a:rPr lang="pt-BR" sz="3600" dirty="0"/>
+              <a:t>     Conceitos e Proposta de Práticas com BDD (1/8)</a:t>
+            </a:r>
+            <a:br>
+              <a:rPr lang="pt-BR" sz="3600" dirty="0"/>
+            </a:br>
+            <a:endParaRPr lang="pt-BR" sz="3600" dirty="0"/>
+          </a:p>
+        </p:txBody>
+      </p:sp>
+      <p:sp>
+        <p:nvSpPr>
+          <p:cNvPr id="3" name="Espaço Reservado para Conteúdo 2">
+            <a:extLst>
+              <a:ext uri="{FF2B5EF4-FFF2-40B4-BE49-F238E27FC236}">
+                <a16:creationId xmlns:a16="http://schemas.microsoft.com/office/drawing/2014/main" id="{A2D8BE35-F8D6-450A-A3C0-60D760579484}"/>
+              </a:ext>
+            </a:extLst>
+          </p:cNvPr>
+          <p:cNvSpPr>
+            <a:spLocks noGrp="1"/>
+          </p:cNvSpPr>
+          <p:nvPr>
+            <p:ph idx="1"/>
+          </p:nvPr>
+        </p:nvSpPr>
+        <p:spPr/>
+        <p:txBody>
+          <a:bodyPr>
+            <a:normAutofit/>
+          </a:bodyPr>
+          <a:lstStyle/>
+          <a:p>
+            <a:r>
+              <a:rPr lang="pt-BR" sz="3200" dirty="0"/>
+              <a:t>Gestão das Comunicações</a:t>
+            </a:r>
+          </a:p>
+          <a:p>
+            <a:pPr lvl="1">
+              <a:buFont typeface="Courier New" panose="02070309020205020404" pitchFamily="49" charset="0"/>
+              <a:buChar char="o"/>
+            </a:pPr>
+            <a:r>
+              <a:rPr lang="pt-BR" sz="2800" dirty="0"/>
+              <a:t>Planejar</a:t>
+            </a:r>
+            <a:r>
+              <a:rPr lang="pt-BR" sz="2800"/>
+              <a:t>, Gerenciar, </a:t>
+            </a:r>
+            <a:r>
+              <a:rPr lang="pt-BR" sz="2800" dirty="0"/>
+              <a:t>Monitorar</a:t>
+            </a:r>
+          </a:p>
+          <a:p>
+            <a:pPr lvl="1">
+              <a:buFont typeface="Courier New" panose="02070309020205020404" pitchFamily="49" charset="0"/>
+              <a:buChar char="o"/>
+            </a:pPr>
+            <a:r>
+              <a:rPr lang="pt-BR" sz="2800" dirty="0"/>
+              <a:t>Identificação de partes interessadas</a:t>
+            </a:r>
+          </a:p>
+          <a:p>
+            <a:pPr lvl="1">
+              <a:buFont typeface="Courier New" panose="02070309020205020404" pitchFamily="49" charset="0"/>
+              <a:buChar char="o"/>
+            </a:pPr>
+            <a:r>
+              <a:rPr lang="pt-BR" sz="2800" dirty="0"/>
+              <a:t>Engajamento de partes interessadas</a:t>
+            </a:r>
+          </a:p>
+          <a:p>
+            <a:pPr lvl="1">
+              <a:buFont typeface="Courier New" panose="02070309020205020404" pitchFamily="49" charset="0"/>
+              <a:buChar char="o"/>
+            </a:pPr>
+            <a:r>
+              <a:rPr lang="pt-BR" sz="2800" dirty="0"/>
+              <a:t>Centralização de documentos em repositório conhecido</a:t>
+            </a:r>
+          </a:p>
+          <a:p>
+            <a:pPr lvl="1">
+              <a:buFont typeface="Courier New" panose="02070309020205020404" pitchFamily="49" charset="0"/>
+              <a:buChar char="o"/>
+            </a:pPr>
+            <a:r>
+              <a:rPr lang="pt-BR" sz="2800" dirty="0"/>
+              <a:t>5 </a:t>
+            </a:r>
+            <a:r>
+              <a:rPr lang="pt-BR" sz="2800" dirty="0" err="1"/>
+              <a:t>C’s</a:t>
+            </a:r>
+            <a:r>
+              <a:rPr lang="pt-BR" sz="2800" dirty="0"/>
+              <a:t> da comunicação escrita:</a:t>
+            </a:r>
+          </a:p>
+          <a:p>
+            <a:pPr lvl="1"/>
+            <a:endParaRPr lang="pt-BR" sz="2800" dirty="0"/>
+          </a:p>
+        </p:txBody>
+      </p:sp>
+      <p:pic>
+        <p:nvPicPr>
+          <p:cNvPr id="6" name="Gráfico 5" descr="Lista com preenchimento sólido">
+            <a:extLst>
+              <a:ext uri="{FF2B5EF4-FFF2-40B4-BE49-F238E27FC236}">
+                <a16:creationId xmlns:a16="http://schemas.microsoft.com/office/drawing/2014/main" id="{B4CD6F79-C664-4BDA-BE69-3952C9F55614}"/>
+              </a:ext>
+            </a:extLst>
+          </p:cNvPr>
+          <p:cNvPicPr>
+            <a:picLocks noChangeAspect="1"/>
+          </p:cNvPicPr>
+          <p:nvPr/>
+        </p:nvPicPr>
+        <p:blipFill>
+          <a:blip r:embed="rId2">
+            <a:extLst>
+              <a:ext uri="{96DAC541-7B7A-43D3-8B79-37D633B846F1}">
+                <asvg:svgBlip xmlns:asvg="http://schemas.microsoft.com/office/drawing/2016/SVG/main" r:embed="rId3"/>
+              </a:ext>
+            </a:extLst>
+          </a:blip>
+          <a:stretch>
+            <a:fillRect/>
+          </a:stretch>
+        </p:blipFill>
+        <p:spPr>
+          <a:xfrm>
+            <a:off x="689704" y="621647"/>
+            <a:ext cx="745798" cy="745798"/>
+          </a:xfrm>
+          <a:prstGeom prst="rect">
+            <a:avLst/>
+          </a:prstGeom>
+        </p:spPr>
+      </p:pic>
+      <p:sp>
+        <p:nvSpPr>
+          <p:cNvPr id="4" name="Elipse 3">
+            <a:extLst>
+              <a:ext uri="{FF2B5EF4-FFF2-40B4-BE49-F238E27FC236}">
+                <a16:creationId xmlns:a16="http://schemas.microsoft.com/office/drawing/2014/main" id="{5D14CABA-0E2B-4E68-AA8C-69E3340FE2C1}"/>
               </a:ext>
             </a:extLst>
           </p:cNvPr>
@@ -9604,10 +9900,10 @@
         </p:nvSpPr>
         <p:spPr>
           <a:xfrm>
-            <a:off x="746912" y="5578969"/>
-            <a:ext cx="4436165" cy="1059955"/>
-          </a:xfrm>
-          <a:prstGeom prst="rect">
+            <a:off x="2427269" y="4721014"/>
+            <a:ext cx="2265531" cy="745798"/>
+          </a:xfrm>
+          <a:prstGeom prst="ellipse">
             <a:avLst/>
           </a:prstGeom>
           <a:solidFill>
@@ -9640,16 +9936,23 @@
           <a:lstStyle/>
           <a:p>
             <a:pPr algn="ctr"/>
-            <a:endParaRPr lang="pt-BR"/>
-          </a:p>
-        </p:txBody>
-      </p:sp>
-      <p:sp>
-        <p:nvSpPr>
-          <p:cNvPr id="18" name="Retângulo: Cantos Arredondados 17">
-            <a:extLst>
-              <a:ext uri="{FF2B5EF4-FFF2-40B4-BE49-F238E27FC236}">
-                <a16:creationId xmlns:a16="http://schemas.microsoft.com/office/drawing/2014/main" id="{B208E847-89C0-463E-87B2-7D95AD260DAF}"/>
+            <a:r>
+              <a:rPr lang="pt-BR" dirty="0">
+                <a:solidFill>
+                  <a:schemeClr val="tx1"/>
+                </a:solidFill>
+              </a:rPr>
+              <a:t>Correta</a:t>
+            </a:r>
+          </a:p>
+        </p:txBody>
+      </p:sp>
+      <p:sp>
+        <p:nvSpPr>
+          <p:cNvPr id="21" name="Elipse 20">
+            <a:extLst>
+              <a:ext uri="{FF2B5EF4-FFF2-40B4-BE49-F238E27FC236}">
+                <a16:creationId xmlns:a16="http://schemas.microsoft.com/office/drawing/2014/main" id="{CD4DB38F-5C65-4FD9-A809-6B56EAA581D2}"/>
               </a:ext>
             </a:extLst>
           </p:cNvPr>
@@ -9658,13 +9961,15 @@
         </p:nvSpPr>
         <p:spPr>
           <a:xfrm>
-            <a:off x="6428188" y="2318523"/>
-            <a:ext cx="4925612" cy="2878744"/>
-          </a:xfrm>
-          <a:prstGeom prst="roundRect">
-            <a:avLst/>
-          </a:prstGeom>
-          <a:noFill/>
+            <a:off x="4963234" y="4721014"/>
+            <a:ext cx="2265531" cy="745798"/>
+          </a:xfrm>
+          <a:prstGeom prst="ellipse">
+            <a:avLst/>
+          </a:prstGeom>
+          <a:solidFill>
+            <a:schemeClr val="bg1"/>
+          </a:solidFill>
           <a:ln>
             <a:solidFill>
               <a:schemeClr val="tx1"/>
@@ -9692,737 +9997,204 @@
           <a:lstStyle/>
           <a:p>
             <a:pPr algn="ctr"/>
-            <a:endParaRPr lang="pt-BR"/>
-          </a:p>
-        </p:txBody>
-      </p:sp>
-      <p:sp>
-        <p:nvSpPr>
-          <p:cNvPr id="2" name="Título 1">
-            <a:extLst>
-              <a:ext uri="{FF2B5EF4-FFF2-40B4-BE49-F238E27FC236}">
-                <a16:creationId xmlns:a16="http://schemas.microsoft.com/office/drawing/2014/main" id="{FFA53715-4976-42BB-9FE5-889E0A122931}"/>
-              </a:ext>
-            </a:extLst>
-          </p:cNvPr>
-          <p:cNvSpPr>
-            <a:spLocks noGrp="1"/>
-          </p:cNvSpPr>
-          <p:nvPr>
-            <p:ph type="title"/>
-          </p:nvPr>
-        </p:nvSpPr>
-        <p:spPr/>
-        <p:txBody>
-          <a:bodyPr>
-            <a:noAutofit/>
-          </a:bodyPr>
-          <a:lstStyle/>
-          <a:p>
-            <a:r>
-              <a:rPr lang="pt-BR" sz="3600" dirty="0"/>
-              <a:t>    </a:t>
-            </a:r>
-            <a:br>
-              <a:rPr lang="pt-BR" sz="3600" dirty="0"/>
-            </a:br>
-            <a:r>
-              <a:rPr lang="pt-BR" sz="3600" dirty="0"/>
-              <a:t>     Conceitos e Proposta de Práticas com BDD (1/8)</a:t>
-            </a:r>
-            <a:br>
-              <a:rPr lang="pt-BR" sz="3600" dirty="0"/>
-            </a:br>
-            <a:endParaRPr lang="pt-BR" sz="3600" dirty="0"/>
-          </a:p>
-        </p:txBody>
-      </p:sp>
-      <p:sp>
-        <p:nvSpPr>
-          <p:cNvPr id="3" name="Espaço Reservado para Conteúdo 2">
-            <a:extLst>
-              <a:ext uri="{FF2B5EF4-FFF2-40B4-BE49-F238E27FC236}">
-                <a16:creationId xmlns:a16="http://schemas.microsoft.com/office/drawing/2014/main" id="{A2D8BE35-F8D6-450A-A3C0-60D760579484}"/>
-              </a:ext>
-            </a:extLst>
-          </p:cNvPr>
-          <p:cNvSpPr>
-            <a:spLocks noGrp="1"/>
-          </p:cNvSpPr>
-          <p:nvPr>
-            <p:ph idx="1"/>
-          </p:nvPr>
-        </p:nvSpPr>
-        <p:spPr/>
-        <p:txBody>
-          <a:bodyPr/>
-          <a:lstStyle/>
-          <a:p>
-            <a:r>
-              <a:rPr lang="pt-BR" i="1" dirty="0" err="1"/>
-              <a:t>Behaviour-Driven</a:t>
-            </a:r>
-            <a:r>
-              <a:rPr lang="pt-BR" i="1" dirty="0"/>
-              <a:t> </a:t>
-            </a:r>
-            <a:r>
-              <a:rPr lang="pt-BR" i="1" dirty="0" err="1"/>
-              <a:t>Development</a:t>
-            </a:r>
-            <a:endParaRPr lang="pt-BR" i="1" dirty="0"/>
-          </a:p>
-        </p:txBody>
-      </p:sp>
-      <p:pic>
-        <p:nvPicPr>
-          <p:cNvPr id="6" name="Gráfico 5" descr="Lista com preenchimento sólido">
-            <a:extLst>
-              <a:ext uri="{FF2B5EF4-FFF2-40B4-BE49-F238E27FC236}">
-                <a16:creationId xmlns:a16="http://schemas.microsoft.com/office/drawing/2014/main" id="{B4CD6F79-C664-4BDA-BE69-3952C9F55614}"/>
-              </a:ext>
-            </a:extLst>
-          </p:cNvPr>
-          <p:cNvPicPr>
-            <a:picLocks noChangeAspect="1"/>
-          </p:cNvPicPr>
+            <a:r>
+              <a:rPr lang="pt-BR" dirty="0">
+                <a:solidFill>
+                  <a:schemeClr val="tx1"/>
+                </a:solidFill>
+              </a:rPr>
+              <a:t>Concisa</a:t>
+            </a:r>
+          </a:p>
+        </p:txBody>
+      </p:sp>
+      <p:sp>
+        <p:nvSpPr>
+          <p:cNvPr id="23" name="Elipse 22">
+            <a:extLst>
+              <a:ext uri="{FF2B5EF4-FFF2-40B4-BE49-F238E27FC236}">
+                <a16:creationId xmlns:a16="http://schemas.microsoft.com/office/drawing/2014/main" id="{36E96FB9-3827-44FD-831D-BEF0A48295F0}"/>
+              </a:ext>
+            </a:extLst>
+          </p:cNvPr>
+          <p:cNvSpPr/>
           <p:nvPr/>
-        </p:nvPicPr>
-        <p:blipFill>
-          <a:blip r:embed="rId2">
-            <a:extLst>
-              <a:ext uri="{96DAC541-7B7A-43D3-8B79-37D633B846F1}">
-                <asvg:svgBlip xmlns:asvg="http://schemas.microsoft.com/office/drawing/2016/SVG/main" r:embed="rId3"/>
-              </a:ext>
-            </a:extLst>
-          </a:blip>
-          <a:stretch>
-            <a:fillRect/>
-          </a:stretch>
-        </p:blipFill>
-        <p:spPr>
-          <a:xfrm>
-            <a:off x="689704" y="621647"/>
-            <a:ext cx="745798" cy="745798"/>
-          </a:xfrm>
-          <a:prstGeom prst="rect">
-            <a:avLst/>
-          </a:prstGeom>
-        </p:spPr>
-      </p:pic>
-      <p:pic>
-        <p:nvPicPr>
-          <p:cNvPr id="8" name="Imagem 7">
-            <a:extLst>
-              <a:ext uri="{FF2B5EF4-FFF2-40B4-BE49-F238E27FC236}">
-                <a16:creationId xmlns:a16="http://schemas.microsoft.com/office/drawing/2014/main" id="{4905842B-768A-4C4D-9E50-8EBC3F39B7F3}"/>
-              </a:ext>
-            </a:extLst>
-          </p:cNvPr>
-          <p:cNvPicPr>
-            <a:picLocks noChangeAspect="1"/>
-          </p:cNvPicPr>
-          <p:nvPr/>
-        </p:nvPicPr>
-        <p:blipFill>
-          <a:blip r:embed="rId4"/>
-          <a:stretch>
-            <a:fillRect/>
-          </a:stretch>
-        </p:blipFill>
-        <p:spPr>
-          <a:xfrm>
-            <a:off x="838200" y="3418382"/>
-            <a:ext cx="2876351" cy="1059955"/>
-          </a:xfrm>
-          <a:prstGeom prst="rect">
-            <a:avLst/>
-          </a:prstGeom>
-        </p:spPr>
-      </p:pic>
-      <p:pic>
-        <p:nvPicPr>
-          <p:cNvPr id="1026" name="Picture 2" descr="Why Test-Driven Development (TDD) | Marsner Technologies">
-            <a:extLst>
-              <a:ext uri="{FF2B5EF4-FFF2-40B4-BE49-F238E27FC236}">
-                <a16:creationId xmlns:a16="http://schemas.microsoft.com/office/drawing/2014/main" id="{95484AF9-CE33-4B55-A8DF-1D72C7701015}"/>
-              </a:ext>
-            </a:extLst>
-          </p:cNvPr>
-          <p:cNvPicPr>
-            <a:picLocks noChangeAspect="1" noChangeArrowheads="1"/>
-          </p:cNvPicPr>
-          <p:nvPr/>
-        </p:nvPicPr>
-        <p:blipFill>
-          <a:blip r:embed="rId5">
-            <a:extLst>
-              <a:ext uri="{28A0092B-C50C-407E-A947-70E740481C1C}">
-                <a14:useLocalDpi xmlns:a14="http://schemas.microsoft.com/office/drawing/2010/main" val="0"/>
-              </a:ext>
-            </a:extLst>
-          </a:blip>
-          <a:srcRect/>
-          <a:stretch>
-            <a:fillRect/>
-          </a:stretch>
-        </p:blipFill>
-        <p:spPr bwMode="auto">
-          <a:xfrm>
-            <a:off x="4053524" y="3198265"/>
-            <a:ext cx="2259107" cy="1500188"/>
-          </a:xfrm>
-          <a:prstGeom prst="rect">
-            <a:avLst/>
-          </a:prstGeom>
-          <a:noFill/>
-          <a:ln>
-            <a:solidFill>
-              <a:schemeClr val="bg1"/>
-            </a:solidFill>
-          </a:ln>
-          <a:extLst>
-            <a:ext uri="{909E8E84-426E-40DD-AFC4-6F175D3DCCD1}">
-              <a14:hiddenFill xmlns:a14="http://schemas.microsoft.com/office/drawing/2010/main">
-                <a:solidFill>
-                  <a:srgbClr val="FFFFFF"/>
-                </a:solidFill>
-              </a14:hiddenFill>
-            </a:ext>
-          </a:extLst>
-        </p:spPr>
-      </p:pic>
-      <p:pic>
-        <p:nvPicPr>
-          <p:cNvPr id="1032" name="Picture 8" descr="Curso Online BDD e Java: Behavior Driven Development com Cucumber | Alura">
-            <a:extLst>
-              <a:ext uri="{FF2B5EF4-FFF2-40B4-BE49-F238E27FC236}">
-                <a16:creationId xmlns:a16="http://schemas.microsoft.com/office/drawing/2014/main" id="{B91D822F-B295-4EB3-9DF2-B804FF879B5D}"/>
-              </a:ext>
-            </a:extLst>
-          </p:cNvPr>
-          <p:cNvPicPr>
-            <a:picLocks noChangeAspect="1" noChangeArrowheads="1"/>
-          </p:cNvPicPr>
-          <p:nvPr/>
-        </p:nvPicPr>
-        <p:blipFill>
-          <a:blip r:embed="rId6">
-            <a:extLst>
-              <a:ext uri="{28A0092B-C50C-407E-A947-70E740481C1C}">
-                <a14:useLocalDpi xmlns:a14="http://schemas.microsoft.com/office/drawing/2010/main" val="0"/>
-              </a:ext>
-            </a:extLst>
-          </a:blip>
-          <a:srcRect/>
-          <a:stretch>
-            <a:fillRect/>
-          </a:stretch>
-        </p:blipFill>
-        <p:spPr bwMode="auto">
-          <a:xfrm>
-            <a:off x="6762796" y="3244754"/>
-            <a:ext cx="1407209" cy="1407209"/>
-          </a:xfrm>
-          <a:prstGeom prst="rect">
-            <a:avLst/>
-          </a:prstGeom>
-          <a:noFill/>
-          <a:extLst>
-            <a:ext uri="{909E8E84-426E-40DD-AFC4-6F175D3DCCD1}">
-              <a14:hiddenFill xmlns:a14="http://schemas.microsoft.com/office/drawing/2010/main">
-                <a:solidFill>
-                  <a:srgbClr val="FFFFFF"/>
-                </a:solidFill>
-              </a14:hiddenFill>
-            </a:ext>
-          </a:extLst>
-        </p:spPr>
-      </p:pic>
-      <p:pic>
-        <p:nvPicPr>
-          <p:cNvPr id="1034" name="Picture 10" descr="BDD - Test Management">
-            <a:extLst>
-              <a:ext uri="{FF2B5EF4-FFF2-40B4-BE49-F238E27FC236}">
-                <a16:creationId xmlns:a16="http://schemas.microsoft.com/office/drawing/2014/main" id="{9C3F32B8-2044-4D94-B196-F31C2E993116}"/>
-              </a:ext>
-            </a:extLst>
-          </p:cNvPr>
-          <p:cNvPicPr>
-            <a:picLocks noChangeAspect="1" noChangeArrowheads="1"/>
-          </p:cNvPicPr>
-          <p:nvPr/>
-        </p:nvPicPr>
-        <p:blipFill>
-          <a:blip r:embed="rId7">
-            <a:extLst>
-              <a:ext uri="{28A0092B-C50C-407E-A947-70E740481C1C}">
-                <a14:useLocalDpi xmlns:a14="http://schemas.microsoft.com/office/drawing/2010/main" val="0"/>
-              </a:ext>
-            </a:extLst>
-          </a:blip>
-          <a:srcRect/>
-          <a:stretch>
-            <a:fillRect/>
-          </a:stretch>
-        </p:blipFill>
-        <p:spPr bwMode="auto">
-          <a:xfrm>
-            <a:off x="8434806" y="2974076"/>
-            <a:ext cx="2635103" cy="1948563"/>
-          </a:xfrm>
-          <a:prstGeom prst="rect">
-            <a:avLst/>
-          </a:prstGeom>
-          <a:noFill/>
-          <a:extLst>
-            <a:ext uri="{909E8E84-426E-40DD-AFC4-6F175D3DCCD1}">
-              <a14:hiddenFill xmlns:a14="http://schemas.microsoft.com/office/drawing/2010/main">
-                <a:solidFill>
-                  <a:srgbClr val="FFFFFF"/>
-                </a:solidFill>
-              </a14:hiddenFill>
-            </a:ext>
-          </a:extLst>
-        </p:spPr>
-      </p:pic>
-      <p:cxnSp>
-        <p:nvCxnSpPr>
-          <p:cNvPr id="12" name="Conector de Seta Reta 11">
-            <a:extLst>
-              <a:ext uri="{FF2B5EF4-FFF2-40B4-BE49-F238E27FC236}">
-                <a16:creationId xmlns:a16="http://schemas.microsoft.com/office/drawing/2014/main" id="{96210B68-72D1-486B-9269-1D515E8A3D06}"/>
-              </a:ext>
-            </a:extLst>
-          </p:cNvPr>
-          <p:cNvCxnSpPr>
-            <a:cxnSpLocks/>
-            <a:stCxn id="8" idx="3"/>
-          </p:cNvCxnSpPr>
-          <p:nvPr/>
-        </p:nvCxnSpPr>
-        <p:spPr>
-          <a:xfrm>
-            <a:off x="3714551" y="3948360"/>
-            <a:ext cx="805324" cy="0"/>
-          </a:xfrm>
-          <a:prstGeom prst="straightConnector1">
-            <a:avLst/>
-          </a:prstGeom>
+        </p:nvSpPr>
+        <p:spPr>
+          <a:xfrm>
+            <a:off x="7499199" y="4721014"/>
+            <a:ext cx="2265531" cy="745798"/>
+          </a:xfrm>
+          <a:prstGeom prst="ellipse">
+            <a:avLst/>
+          </a:prstGeom>
+          <a:solidFill>
+            <a:schemeClr val="bg1"/>
+          </a:solidFill>
           <a:ln>
             <a:solidFill>
               <a:schemeClr val="tx1"/>
             </a:solidFill>
-            <a:tailEnd type="triangle"/>
           </a:ln>
         </p:spPr>
         <p:style>
-          <a:lnRef idx="1">
-            <a:schemeClr val="accent1"/>
+          <a:lnRef idx="2">
+            <a:schemeClr val="accent1">
+              <a:shade val="50000"/>
+            </a:schemeClr>
           </a:lnRef>
-          <a:fillRef idx="0">
+          <a:fillRef idx="1">
             <a:schemeClr val="accent1"/>
           </a:fillRef>
           <a:effectRef idx="0">
             <a:schemeClr val="accent1"/>
           </a:effectRef>
           <a:fontRef idx="minor">
-            <a:schemeClr val="tx1"/>
+            <a:schemeClr val="lt1"/>
           </a:fontRef>
         </p:style>
-      </p:cxnSp>
-      <p:cxnSp>
-        <p:nvCxnSpPr>
-          <p:cNvPr id="16" name="Conector de Seta Reta 15">
-            <a:extLst>
-              <a:ext uri="{FF2B5EF4-FFF2-40B4-BE49-F238E27FC236}">
-                <a16:creationId xmlns:a16="http://schemas.microsoft.com/office/drawing/2014/main" id="{6AE7B240-DF44-4CEA-B16D-59AA69989E18}"/>
-              </a:ext>
-            </a:extLst>
-          </p:cNvPr>
-          <p:cNvCxnSpPr>
-            <a:cxnSpLocks/>
-          </p:cNvCxnSpPr>
+        <p:txBody>
+          <a:bodyPr rtlCol="0" anchor="ctr"/>
+          <a:lstStyle/>
+          <a:p>
+            <a:pPr algn="ctr"/>
+            <a:r>
+              <a:rPr lang="pt-BR" dirty="0">
+                <a:solidFill>
+                  <a:schemeClr val="tx1"/>
+                </a:solidFill>
+              </a:rPr>
+              <a:t>Clara</a:t>
+            </a:r>
+          </a:p>
+        </p:txBody>
+      </p:sp>
+      <p:sp>
+        <p:nvSpPr>
+          <p:cNvPr id="24" name="Elipse 23">
+            <a:extLst>
+              <a:ext uri="{FF2B5EF4-FFF2-40B4-BE49-F238E27FC236}">
+                <a16:creationId xmlns:a16="http://schemas.microsoft.com/office/drawing/2014/main" id="{FF9D9978-7089-4E34-A81A-B6D8F21EDD3F}"/>
+              </a:ext>
+            </a:extLst>
+          </p:cNvPr>
+          <p:cNvSpPr/>
           <p:nvPr/>
-        </p:nvCxnSpPr>
-        <p:spPr>
-          <a:xfrm>
-            <a:off x="5871597" y="3948359"/>
-            <a:ext cx="556591" cy="0"/>
-          </a:xfrm>
-          <a:prstGeom prst="straightConnector1">
-            <a:avLst/>
-          </a:prstGeom>
+        </p:nvSpPr>
+        <p:spPr>
+          <a:xfrm>
+            <a:off x="3672973" y="5590188"/>
+            <a:ext cx="2265531" cy="745798"/>
+          </a:xfrm>
+          <a:prstGeom prst="ellipse">
+            <a:avLst/>
+          </a:prstGeom>
+          <a:solidFill>
+            <a:schemeClr val="bg1"/>
+          </a:solidFill>
           <a:ln>
             <a:solidFill>
               <a:schemeClr val="tx1"/>
             </a:solidFill>
-            <a:tailEnd type="triangle"/>
           </a:ln>
         </p:spPr>
         <p:style>
-          <a:lnRef idx="1">
-            <a:schemeClr val="accent1"/>
+          <a:lnRef idx="2">
+            <a:schemeClr val="accent1">
+              <a:shade val="50000"/>
+            </a:schemeClr>
           </a:lnRef>
-          <a:fillRef idx="0">
+          <a:fillRef idx="1">
             <a:schemeClr val="accent1"/>
           </a:fillRef>
           <a:effectRef idx="0">
             <a:schemeClr val="accent1"/>
           </a:effectRef>
           <a:fontRef idx="minor">
-            <a:schemeClr val="tx1"/>
+            <a:schemeClr val="lt1"/>
           </a:fontRef>
         </p:style>
-      </p:cxnSp>
-      <p:sp>
-        <p:nvSpPr>
-          <p:cNvPr id="19" name="CaixaDeTexto 18">
-            <a:extLst>
-              <a:ext uri="{FF2B5EF4-FFF2-40B4-BE49-F238E27FC236}">
-                <a16:creationId xmlns:a16="http://schemas.microsoft.com/office/drawing/2014/main" id="{3C12A7F1-E6E7-421E-866C-34D0501EDA58}"/>
-              </a:ext>
-            </a:extLst>
-          </p:cNvPr>
-          <p:cNvSpPr txBox="1"/>
+        <p:txBody>
+          <a:bodyPr rtlCol="0" anchor="ctr"/>
+          <a:lstStyle/>
+          <a:p>
+            <a:pPr algn="ctr"/>
+            <a:r>
+              <a:rPr lang="pt-BR" dirty="0">
+                <a:solidFill>
+                  <a:schemeClr val="tx1"/>
+                </a:solidFill>
+              </a:rPr>
+              <a:t>Coerente</a:t>
+            </a:r>
+          </a:p>
+        </p:txBody>
+      </p:sp>
+      <p:sp>
+        <p:nvSpPr>
+          <p:cNvPr id="25" name="Elipse 24">
+            <a:extLst>
+              <a:ext uri="{FF2B5EF4-FFF2-40B4-BE49-F238E27FC236}">
+                <a16:creationId xmlns:a16="http://schemas.microsoft.com/office/drawing/2014/main" id="{9898F11C-439A-4E82-A38F-57CE12EE74A0}"/>
+              </a:ext>
+            </a:extLst>
+          </p:cNvPr>
+          <p:cNvSpPr/>
           <p:nvPr/>
         </p:nvSpPr>
         <p:spPr>
           <a:xfrm>
-            <a:off x="8885919" y="2374305"/>
-            <a:ext cx="1891907" cy="646331"/>
-          </a:xfrm>
-          <a:prstGeom prst="rect">
-            <a:avLst/>
-          </a:prstGeom>
-          <a:noFill/>
-        </p:spPr>
-        <p:txBody>
-          <a:bodyPr wrap="square" rtlCol="0">
-            <a:spAutoFit/>
-          </a:bodyPr>
-          <a:lstStyle/>
-          <a:p>
-            <a:pPr algn="ctr"/>
-            <a:r>
-              <a:rPr lang="pt-BR" dirty="0"/>
-              <a:t>Sintaxe </a:t>
-            </a:r>
-            <a:r>
-              <a:rPr lang="pt-BR" i="1" dirty="0" err="1"/>
-              <a:t>Gherkin</a:t>
-            </a:r>
-            <a:r>
-              <a:rPr lang="pt-BR" i="1" dirty="0"/>
-              <a:t> </a:t>
-            </a:r>
-            <a:r>
-              <a:rPr lang="pt-BR" dirty="0"/>
-              <a:t>e </a:t>
-            </a:r>
-          </a:p>
-          <a:p>
-            <a:pPr algn="ctr"/>
-            <a:r>
-              <a:rPr lang="pt-BR" dirty="0"/>
-              <a:t>linguagem ubíqua</a:t>
-            </a:r>
-            <a:endParaRPr lang="pt-BR" i="1" dirty="0"/>
-          </a:p>
-        </p:txBody>
-      </p:sp>
-      <p:sp>
-        <p:nvSpPr>
-          <p:cNvPr id="20" name="CaixaDeTexto 19">
-            <a:extLst>
-              <a:ext uri="{FF2B5EF4-FFF2-40B4-BE49-F238E27FC236}">
-                <a16:creationId xmlns:a16="http://schemas.microsoft.com/office/drawing/2014/main" id="{0DD88253-A17A-4D2E-9364-286F1724D640}"/>
-              </a:ext>
-            </a:extLst>
-          </p:cNvPr>
-          <p:cNvSpPr txBox="1"/>
-          <p:nvPr/>
-        </p:nvSpPr>
-        <p:spPr>
-          <a:xfrm>
-            <a:off x="6111218" y="5646577"/>
-            <a:ext cx="5549401" cy="923330"/>
-          </a:xfrm>
-          <a:prstGeom prst="rect">
-            <a:avLst/>
-          </a:prstGeom>
-          <a:noFill/>
+            <a:off x="6366433" y="5590188"/>
+            <a:ext cx="2265531" cy="745798"/>
+          </a:xfrm>
+          <a:prstGeom prst="ellipse">
+            <a:avLst/>
+          </a:prstGeom>
+          <a:solidFill>
+            <a:schemeClr val="bg1"/>
+          </a:solidFill>
           <a:ln>
             <a:solidFill>
               <a:schemeClr val="tx1"/>
             </a:solidFill>
           </a:ln>
         </p:spPr>
-        <p:txBody>
-          <a:bodyPr wrap="square" rtlCol="0">
-            <a:spAutoFit/>
-          </a:bodyPr>
-          <a:lstStyle/>
-          <a:p>
-            <a:pPr algn="just"/>
-            <a:r>
-              <a:rPr lang="pt-BR" dirty="0"/>
-              <a:t>“Não é um meio de testar </a:t>
-            </a:r>
-            <a:r>
-              <a:rPr lang="pt-BR" i="1" dirty="0"/>
-              <a:t>software</a:t>
-            </a:r>
-            <a:r>
-              <a:rPr lang="pt-BR" dirty="0"/>
-              <a:t>, mas sim de testar o entendimento das pessoas em como um </a:t>
-            </a:r>
-            <a:r>
-              <a:rPr lang="pt-BR" i="1" dirty="0"/>
-              <a:t>software</a:t>
-            </a:r>
-            <a:r>
-              <a:rPr lang="pt-BR" dirty="0"/>
-              <a:t>, ainda a ser escrito, deve se comportar”</a:t>
-            </a:r>
-          </a:p>
-        </p:txBody>
-      </p:sp>
-      <p:cxnSp>
-        <p:nvCxnSpPr>
-          <p:cNvPr id="22" name="Conector de Seta Reta 21">
-            <a:extLst>
-              <a:ext uri="{FF2B5EF4-FFF2-40B4-BE49-F238E27FC236}">
-                <a16:creationId xmlns:a16="http://schemas.microsoft.com/office/drawing/2014/main" id="{790448D3-BADC-4C11-86EF-C64081B2B4EF}"/>
-              </a:ext>
-            </a:extLst>
-          </p:cNvPr>
-          <p:cNvCxnSpPr>
-            <a:stCxn id="18" idx="2"/>
-            <a:endCxn id="20" idx="0"/>
-          </p:cNvCxnSpPr>
-          <p:nvPr/>
-        </p:nvCxnSpPr>
-        <p:spPr>
-          <a:xfrm flipH="1">
-            <a:off x="8885919" y="5197267"/>
-            <a:ext cx="5075" cy="449310"/>
-          </a:xfrm>
-          <a:prstGeom prst="straightConnector1">
-            <a:avLst/>
-          </a:prstGeom>
-          <a:ln>
-            <a:solidFill>
-              <a:schemeClr val="tx1"/>
-            </a:solidFill>
-            <a:tailEnd type="triangle"/>
-          </a:ln>
-        </p:spPr>
         <p:style>
-          <a:lnRef idx="1">
-            <a:schemeClr val="accent1"/>
+          <a:lnRef idx="2">
+            <a:schemeClr val="accent1">
+              <a:shade val="50000"/>
+            </a:schemeClr>
           </a:lnRef>
-          <a:fillRef idx="0">
+          <a:fillRef idx="1">
             <a:schemeClr val="accent1"/>
           </a:fillRef>
           <a:effectRef idx="0">
             <a:schemeClr val="accent1"/>
           </a:effectRef>
           <a:fontRef idx="minor">
-            <a:schemeClr val="tx1"/>
+            <a:schemeClr val="lt1"/>
           </a:fontRef>
         </p:style>
-      </p:cxnSp>
-      <p:pic>
-        <p:nvPicPr>
-          <p:cNvPr id="1038" name="Picture 14" descr="Line,Icon,Circle,Symbol,Logo #47838 - Free Icon Library">
-            <a:extLst>
-              <a:ext uri="{FF2B5EF4-FFF2-40B4-BE49-F238E27FC236}">
-                <a16:creationId xmlns:a16="http://schemas.microsoft.com/office/drawing/2014/main" id="{49B66718-3327-42C4-8B61-FFE40C1088B9}"/>
-              </a:ext>
-            </a:extLst>
-          </p:cNvPr>
-          <p:cNvPicPr>
-            <a:picLocks noChangeAspect="1" noChangeArrowheads="1"/>
-          </p:cNvPicPr>
-          <p:nvPr/>
-        </p:nvPicPr>
-        <p:blipFill>
-          <a:blip r:embed="rId8">
-            <a:extLst>
-              <a:ext uri="{28A0092B-C50C-407E-A947-70E740481C1C}">
-                <a14:useLocalDpi xmlns:a14="http://schemas.microsoft.com/office/drawing/2010/main" val="0"/>
-              </a:ext>
-            </a:extLst>
-          </a:blip>
-          <a:srcRect/>
-          <a:stretch>
-            <a:fillRect/>
-          </a:stretch>
-        </p:blipFill>
-        <p:spPr bwMode="auto">
-          <a:xfrm>
-            <a:off x="838200" y="5720509"/>
-            <a:ext cx="656642" cy="656642"/>
-          </a:xfrm>
-          <a:prstGeom prst="rect">
-            <a:avLst/>
-          </a:prstGeom>
-          <a:noFill/>
-          <a:extLst>
-            <a:ext uri="{909E8E84-426E-40DD-AFC4-6F175D3DCCD1}">
-              <a14:hiddenFill xmlns:a14="http://schemas.microsoft.com/office/drawing/2010/main">
+        <p:txBody>
+          <a:bodyPr rtlCol="0" anchor="ctr"/>
+          <a:lstStyle/>
+          <a:p>
+            <a:pPr algn="ctr"/>
+            <a:r>
+              <a:rPr lang="pt-BR" dirty="0">
                 <a:solidFill>
-                  <a:srgbClr val="FFFFFF"/>
+                  <a:schemeClr val="tx1"/>
                 </a:solidFill>
-              </a14:hiddenFill>
-            </a:ext>
-          </a:extLst>
-        </p:spPr>
-      </p:pic>
-      <p:sp>
-        <p:nvSpPr>
-          <p:cNvPr id="26" name="CaixaDeTexto 25">
-            <a:extLst>
-              <a:ext uri="{FF2B5EF4-FFF2-40B4-BE49-F238E27FC236}">
-                <a16:creationId xmlns:a16="http://schemas.microsoft.com/office/drawing/2014/main" id="{7DC88D43-8DAF-4AC0-86D9-6452DDD7BFED}"/>
-              </a:ext>
-            </a:extLst>
-          </p:cNvPr>
-          <p:cNvSpPr txBox="1"/>
-          <p:nvPr/>
-        </p:nvSpPr>
-        <p:spPr>
-          <a:xfrm>
-            <a:off x="1494842" y="5727695"/>
-            <a:ext cx="3464057" cy="923330"/>
-          </a:xfrm>
-          <a:prstGeom prst="rect">
-            <a:avLst/>
-          </a:prstGeom>
-          <a:noFill/>
-        </p:spPr>
-        <p:txBody>
-          <a:bodyPr wrap="square" rtlCol="0">
-            <a:spAutoFit/>
-          </a:bodyPr>
-          <a:lstStyle/>
-          <a:p>
-            <a:pPr algn="just"/>
-            <a:r>
-              <a:rPr lang="pt-BR" dirty="0"/>
-              <a:t>14 fatores para escrita de cenários </a:t>
-            </a:r>
-          </a:p>
-          <a:p>
-            <a:pPr algn="just"/>
-            <a:r>
-              <a:rPr lang="pt-BR" dirty="0"/>
-              <a:t>BDD com qualidade</a:t>
-            </a:r>
-          </a:p>
-          <a:p>
-            <a:pPr algn="just"/>
-            <a:endParaRPr lang="pt-BR" dirty="0"/>
-          </a:p>
-        </p:txBody>
-      </p:sp>
-      <p:cxnSp>
-        <p:nvCxnSpPr>
-          <p:cNvPr id="29" name="Conector de Seta Reta 28">
-            <a:extLst>
-              <a:ext uri="{FF2B5EF4-FFF2-40B4-BE49-F238E27FC236}">
-                <a16:creationId xmlns:a16="http://schemas.microsoft.com/office/drawing/2014/main" id="{3461D599-5C03-417A-9327-A2B9CDE4D3E5}"/>
-              </a:ext>
-            </a:extLst>
-          </p:cNvPr>
-          <p:cNvCxnSpPr>
-            <a:stCxn id="20" idx="1"/>
-            <a:endCxn id="27" idx="3"/>
-          </p:cNvCxnSpPr>
-          <p:nvPr/>
-        </p:nvCxnSpPr>
-        <p:spPr>
-          <a:xfrm flipH="1">
-            <a:off x="5183077" y="6108242"/>
-            <a:ext cx="928141" cy="705"/>
-          </a:xfrm>
-          <a:prstGeom prst="straightConnector1">
-            <a:avLst/>
-          </a:prstGeom>
-          <a:ln>
-            <a:solidFill>
-              <a:schemeClr val="tx1"/>
-            </a:solidFill>
-            <a:tailEnd type="triangle"/>
-          </a:ln>
-        </p:spPr>
-        <p:style>
-          <a:lnRef idx="1">
-            <a:schemeClr val="accent1"/>
-          </a:lnRef>
-          <a:fillRef idx="0">
-            <a:schemeClr val="accent1"/>
-          </a:fillRef>
-          <a:effectRef idx="0">
-            <a:schemeClr val="accent1"/>
-          </a:effectRef>
-          <a:fontRef idx="minor">
-            <a:schemeClr val="tx1"/>
-          </a:fontRef>
-        </p:style>
-      </p:cxnSp>
-      <p:pic>
-        <p:nvPicPr>
-          <p:cNvPr id="1040" name="Picture 16" descr="Requirements Engineering Tutorial - Tonex Training">
-            <a:extLst>
-              <a:ext uri="{FF2B5EF4-FFF2-40B4-BE49-F238E27FC236}">
-                <a16:creationId xmlns:a16="http://schemas.microsoft.com/office/drawing/2014/main" id="{7C93ECA4-E813-419A-9121-9C5F288DA8F4}"/>
-              </a:ext>
-            </a:extLst>
-          </p:cNvPr>
-          <p:cNvPicPr>
-            <a:picLocks noChangeAspect="1" noChangeArrowheads="1"/>
-          </p:cNvPicPr>
-          <p:nvPr/>
-        </p:nvPicPr>
-        <p:blipFill>
-          <a:blip r:embed="rId9">
-            <a:extLst>
-              <a:ext uri="{28A0092B-C50C-407E-A947-70E740481C1C}">
-                <a14:useLocalDpi xmlns:a14="http://schemas.microsoft.com/office/drawing/2010/main" val="0"/>
-              </a:ext>
-            </a:extLst>
-          </a:blip>
-          <a:srcRect/>
-          <a:stretch>
-            <a:fillRect/>
-          </a:stretch>
-        </p:blipFill>
-        <p:spPr bwMode="auto">
-          <a:xfrm>
-            <a:off x="6704696" y="2384457"/>
-            <a:ext cx="745798" cy="515166"/>
-          </a:xfrm>
-          <a:prstGeom prst="rect">
-            <a:avLst/>
-          </a:prstGeom>
-          <a:noFill/>
-          <a:extLst>
-            <a:ext uri="{909E8E84-426E-40DD-AFC4-6F175D3DCCD1}">
-              <a14:hiddenFill xmlns:a14="http://schemas.microsoft.com/office/drawing/2010/main">
-                <a:solidFill>
-                  <a:srgbClr val="FFFFFF"/>
-                </a:solidFill>
-              </a14:hiddenFill>
-            </a:ext>
-          </a:extLst>
-        </p:spPr>
-      </p:pic>
+              </a:rPr>
+              <a:t>Controlada</a:t>
+            </a:r>
+          </a:p>
+        </p:txBody>
+      </p:sp>
     </p:spTree>
     <p:extLst>
       <p:ext uri="{BB962C8B-B14F-4D97-AF65-F5344CB8AC3E}">
-        <p14:creationId xmlns:p14="http://schemas.microsoft.com/office/powerpoint/2010/main" val="2952457486"/>
+        <p14:creationId xmlns:p14="http://schemas.microsoft.com/office/powerpoint/2010/main" val="1154063287"/>
       </p:ext>
     </p:extLst>
   </p:cSld>
@@ -10451,179 +10223,10 @@
       </p:grpSpPr>
       <p:sp>
         <p:nvSpPr>
-          <p:cNvPr id="2" name="Título 1">
-            <a:extLst>
-              <a:ext uri="{FF2B5EF4-FFF2-40B4-BE49-F238E27FC236}">
-                <a16:creationId xmlns:a16="http://schemas.microsoft.com/office/drawing/2014/main" id="{FFA53715-4976-42BB-9FE5-889E0A122931}"/>
-              </a:ext>
-            </a:extLst>
-          </p:cNvPr>
-          <p:cNvSpPr>
-            <a:spLocks noGrp="1"/>
-          </p:cNvSpPr>
-          <p:nvPr>
-            <p:ph type="title"/>
-          </p:nvPr>
-        </p:nvSpPr>
-        <p:spPr/>
-        <p:txBody>
-          <a:bodyPr>
-            <a:noAutofit/>
-          </a:bodyPr>
-          <a:lstStyle/>
-          <a:p>
-            <a:r>
-              <a:rPr lang="pt-BR" sz="3600" dirty="0"/>
-              <a:t>    </a:t>
-            </a:r>
-            <a:br>
-              <a:rPr lang="pt-BR" sz="3600" dirty="0"/>
-            </a:br>
-            <a:r>
-              <a:rPr lang="pt-BR" sz="3600" dirty="0"/>
-              <a:t>     Conceitos e Proposta de Práticas com BDD (2/8)</a:t>
-            </a:r>
-            <a:br>
-              <a:rPr lang="pt-BR" sz="3600" dirty="0"/>
-            </a:br>
-            <a:endParaRPr lang="pt-BR" sz="3600" dirty="0"/>
-          </a:p>
-        </p:txBody>
-      </p:sp>
-      <p:sp>
-        <p:nvSpPr>
-          <p:cNvPr id="3" name="Espaço Reservado para Conteúdo 2">
-            <a:extLst>
-              <a:ext uri="{FF2B5EF4-FFF2-40B4-BE49-F238E27FC236}">
-                <a16:creationId xmlns:a16="http://schemas.microsoft.com/office/drawing/2014/main" id="{A2D8BE35-F8D6-450A-A3C0-60D760579484}"/>
-              </a:ext>
-            </a:extLst>
-          </p:cNvPr>
-          <p:cNvSpPr>
-            <a:spLocks noGrp="1"/>
-          </p:cNvSpPr>
-          <p:nvPr>
-            <p:ph idx="1"/>
-          </p:nvPr>
-        </p:nvSpPr>
-        <p:spPr/>
-        <p:txBody>
-          <a:bodyPr>
-            <a:normAutofit/>
-          </a:bodyPr>
-          <a:lstStyle/>
-          <a:p>
-            <a:r>
-              <a:rPr lang="pt-BR" sz="3200" dirty="0"/>
-              <a:t>Gestão das Comunicações</a:t>
-            </a:r>
-          </a:p>
-          <a:p>
-            <a:pPr lvl="1">
-              <a:buFont typeface="Courier New" panose="02070309020205020404" pitchFamily="49" charset="0"/>
-              <a:buChar char="o"/>
-            </a:pPr>
-            <a:r>
-              <a:rPr lang="pt-BR" sz="2800" dirty="0"/>
-              <a:t>Planejar, Controlar, Monitorar</a:t>
-            </a:r>
-          </a:p>
-          <a:p>
-            <a:pPr lvl="1">
-              <a:buFont typeface="Courier New" panose="02070309020205020404" pitchFamily="49" charset="0"/>
-              <a:buChar char="o"/>
-            </a:pPr>
-            <a:r>
-              <a:rPr lang="pt-BR" sz="2800" dirty="0"/>
-              <a:t>Identificação de partes interessadas</a:t>
-            </a:r>
-          </a:p>
-          <a:p>
-            <a:pPr lvl="1">
-              <a:buFont typeface="Courier New" panose="02070309020205020404" pitchFamily="49" charset="0"/>
-              <a:buChar char="o"/>
-            </a:pPr>
-            <a:r>
-              <a:rPr lang="pt-BR" sz="2800" dirty="0"/>
-              <a:t>Engajamento de partes interessadas</a:t>
-            </a:r>
-          </a:p>
-          <a:p>
-            <a:pPr lvl="1">
-              <a:buFont typeface="Courier New" panose="02070309020205020404" pitchFamily="49" charset="0"/>
-              <a:buChar char="o"/>
-            </a:pPr>
-            <a:r>
-              <a:rPr lang="pt-BR" sz="2800" dirty="0"/>
-              <a:t>Centralização de documentos em repositório conhecido</a:t>
-            </a:r>
-          </a:p>
-          <a:p>
-            <a:pPr lvl="1">
-              <a:buFont typeface="Courier New" panose="02070309020205020404" pitchFamily="49" charset="0"/>
-              <a:buChar char="o"/>
-            </a:pPr>
-            <a:r>
-              <a:rPr lang="pt-BR" sz="2800" dirty="0"/>
-              <a:t>5 </a:t>
-            </a:r>
-            <a:r>
-              <a:rPr lang="pt-BR" sz="2800" dirty="0" err="1"/>
-              <a:t>C’s</a:t>
-            </a:r>
-            <a:r>
-              <a:rPr lang="pt-BR" sz="2800" dirty="0"/>
-              <a:t> da comunicação escrita:</a:t>
-            </a:r>
-          </a:p>
-          <a:p>
-            <a:pPr lvl="1"/>
-            <a:endParaRPr lang="pt-BR" sz="2800" dirty="0"/>
-          </a:p>
-        </p:txBody>
-      </p:sp>
-      <p:pic>
-        <p:nvPicPr>
-          <p:cNvPr id="6" name="Gráfico 5" descr="Lista com preenchimento sólido">
-            <a:extLst>
-              <a:ext uri="{FF2B5EF4-FFF2-40B4-BE49-F238E27FC236}">
-                <a16:creationId xmlns:a16="http://schemas.microsoft.com/office/drawing/2014/main" id="{B4CD6F79-C664-4BDA-BE69-3952C9F55614}"/>
-              </a:ext>
-            </a:extLst>
-          </p:cNvPr>
-          <p:cNvPicPr>
-            <a:picLocks noChangeAspect="1"/>
-          </p:cNvPicPr>
-          <p:nvPr/>
-        </p:nvPicPr>
-        <p:blipFill>
-          <a:blip r:embed="rId2">
-            <a:extLst>
-              <a:ext uri="{96DAC541-7B7A-43D3-8B79-37D633B846F1}">
-                <asvg:svgBlip xmlns:asvg="http://schemas.microsoft.com/office/drawing/2016/SVG/main" r:embed="rId3"/>
-              </a:ext>
-            </a:extLst>
-          </a:blip>
-          <a:stretch>
-            <a:fillRect/>
-          </a:stretch>
-        </p:blipFill>
-        <p:spPr>
-          <a:xfrm>
-            <a:off x="689704" y="621647"/>
-            <a:ext cx="745798" cy="745798"/>
-          </a:xfrm>
-          <a:prstGeom prst="rect">
-            <a:avLst/>
-          </a:prstGeom>
-        </p:spPr>
-      </p:pic>
-      <p:sp>
-        <p:nvSpPr>
-          <p:cNvPr id="4" name="Elipse 3">
-            <a:extLst>
-              <a:ext uri="{FF2B5EF4-FFF2-40B4-BE49-F238E27FC236}">
-                <a16:creationId xmlns:a16="http://schemas.microsoft.com/office/drawing/2014/main" id="{5D14CABA-0E2B-4E68-AA8C-69E3340FE2C1}"/>
+          <p:cNvPr id="27" name="Retângulo 26">
+            <a:extLst>
+              <a:ext uri="{FF2B5EF4-FFF2-40B4-BE49-F238E27FC236}">
+                <a16:creationId xmlns:a16="http://schemas.microsoft.com/office/drawing/2014/main" id="{AB7B73A2-0C0A-4F72-B508-36F3389860CA}"/>
               </a:ext>
             </a:extLst>
           </p:cNvPr>
@@ -10632,10 +10235,10 @@
         </p:nvSpPr>
         <p:spPr>
           <a:xfrm>
-            <a:off x="2427269" y="4721014"/>
-            <a:ext cx="2265531" cy="745798"/>
-          </a:xfrm>
-          <a:prstGeom prst="ellipse">
+            <a:off x="746912" y="5578969"/>
+            <a:ext cx="4436165" cy="1059955"/>
+          </a:xfrm>
+          <a:prstGeom prst="rect">
             <a:avLst/>
           </a:prstGeom>
           <a:solidFill>
@@ -10668,23 +10271,16 @@
           <a:lstStyle/>
           <a:p>
             <a:pPr algn="ctr"/>
-            <a:r>
-              <a:rPr lang="pt-BR" dirty="0">
-                <a:solidFill>
-                  <a:schemeClr val="tx1"/>
-                </a:solidFill>
-              </a:rPr>
-              <a:t>Correta</a:t>
-            </a:r>
-          </a:p>
-        </p:txBody>
-      </p:sp>
-      <p:sp>
-        <p:nvSpPr>
-          <p:cNvPr id="21" name="Elipse 20">
-            <a:extLst>
-              <a:ext uri="{FF2B5EF4-FFF2-40B4-BE49-F238E27FC236}">
-                <a16:creationId xmlns:a16="http://schemas.microsoft.com/office/drawing/2014/main" id="{CD4DB38F-5C65-4FD9-A809-6B56EAA581D2}"/>
+            <a:endParaRPr lang="pt-BR"/>
+          </a:p>
+        </p:txBody>
+      </p:sp>
+      <p:sp>
+        <p:nvSpPr>
+          <p:cNvPr id="18" name="Retângulo: Cantos Arredondados 17">
+            <a:extLst>
+              <a:ext uri="{FF2B5EF4-FFF2-40B4-BE49-F238E27FC236}">
+                <a16:creationId xmlns:a16="http://schemas.microsoft.com/office/drawing/2014/main" id="{B208E847-89C0-463E-87B2-7D95AD260DAF}"/>
               </a:ext>
             </a:extLst>
           </p:cNvPr>
@@ -10693,15 +10289,13 @@
         </p:nvSpPr>
         <p:spPr>
           <a:xfrm>
-            <a:off x="4963234" y="4721014"/>
-            <a:ext cx="2265531" cy="745798"/>
-          </a:xfrm>
-          <a:prstGeom prst="ellipse">
-            <a:avLst/>
-          </a:prstGeom>
-          <a:solidFill>
-            <a:schemeClr val="bg1"/>
-          </a:solidFill>
+            <a:off x="6428188" y="2318523"/>
+            <a:ext cx="4925612" cy="2878744"/>
+          </a:xfrm>
+          <a:prstGeom prst="roundRect">
+            <a:avLst/>
+          </a:prstGeom>
+          <a:noFill/>
           <a:ln>
             <a:solidFill>
               <a:schemeClr val="tx1"/>
@@ -10729,204 +10323,749 @@
           <a:lstStyle/>
           <a:p>
             <a:pPr algn="ctr"/>
-            <a:r>
-              <a:rPr lang="pt-BR" dirty="0">
+            <a:endParaRPr lang="pt-BR"/>
+          </a:p>
+        </p:txBody>
+      </p:sp>
+      <p:sp>
+        <p:nvSpPr>
+          <p:cNvPr id="2" name="Título 1">
+            <a:extLst>
+              <a:ext uri="{FF2B5EF4-FFF2-40B4-BE49-F238E27FC236}">
+                <a16:creationId xmlns:a16="http://schemas.microsoft.com/office/drawing/2014/main" id="{FFA53715-4976-42BB-9FE5-889E0A122931}"/>
+              </a:ext>
+            </a:extLst>
+          </p:cNvPr>
+          <p:cNvSpPr>
+            <a:spLocks noGrp="1"/>
+          </p:cNvSpPr>
+          <p:nvPr>
+            <p:ph type="title"/>
+          </p:nvPr>
+        </p:nvSpPr>
+        <p:spPr/>
+        <p:txBody>
+          <a:bodyPr>
+            <a:noAutofit/>
+          </a:bodyPr>
+          <a:lstStyle/>
+          <a:p>
+            <a:r>
+              <a:rPr lang="pt-BR" sz="3600" dirty="0"/>
+              <a:t>    </a:t>
+            </a:r>
+            <a:br>
+              <a:rPr lang="pt-BR" sz="3600" dirty="0"/>
+            </a:br>
+            <a:r>
+              <a:rPr lang="pt-BR" sz="3600" dirty="0"/>
+              <a:t>     Conceitos e Proposta de Práticas com </a:t>
+            </a:r>
+            <a:r>
+              <a:rPr lang="pt-BR" sz="3600"/>
+              <a:t>BDD (2/8</a:t>
+            </a:r>
+            <a:r>
+              <a:rPr lang="pt-BR" sz="3600" dirty="0"/>
+              <a:t>)</a:t>
+            </a:r>
+            <a:br>
+              <a:rPr lang="pt-BR" sz="3600" dirty="0"/>
+            </a:br>
+            <a:endParaRPr lang="pt-BR" sz="3600" dirty="0"/>
+          </a:p>
+        </p:txBody>
+      </p:sp>
+      <p:sp>
+        <p:nvSpPr>
+          <p:cNvPr id="3" name="Espaço Reservado para Conteúdo 2">
+            <a:extLst>
+              <a:ext uri="{FF2B5EF4-FFF2-40B4-BE49-F238E27FC236}">
+                <a16:creationId xmlns:a16="http://schemas.microsoft.com/office/drawing/2014/main" id="{A2D8BE35-F8D6-450A-A3C0-60D760579484}"/>
+              </a:ext>
+            </a:extLst>
+          </p:cNvPr>
+          <p:cNvSpPr>
+            <a:spLocks noGrp="1"/>
+          </p:cNvSpPr>
+          <p:nvPr>
+            <p:ph idx="1"/>
+          </p:nvPr>
+        </p:nvSpPr>
+        <p:spPr>
+          <a:xfrm>
+            <a:off x="838200" y="1620781"/>
+            <a:ext cx="10515600" cy="4351338"/>
+          </a:xfrm>
+        </p:spPr>
+        <p:txBody>
+          <a:bodyPr/>
+          <a:lstStyle/>
+          <a:p>
+            <a:r>
+              <a:rPr lang="pt-BR" dirty="0"/>
+              <a:t>BDD</a:t>
+            </a:r>
+            <a:r>
+              <a:rPr lang="pt-BR" i="1" dirty="0"/>
+              <a:t> </a:t>
+            </a:r>
+            <a:r>
+              <a:rPr lang="pt-BR" dirty="0"/>
+              <a:t>como abordagem de engenharia de requisitos</a:t>
+            </a:r>
+          </a:p>
+        </p:txBody>
+      </p:sp>
+      <p:pic>
+        <p:nvPicPr>
+          <p:cNvPr id="6" name="Gráfico 5" descr="Lista com preenchimento sólido">
+            <a:extLst>
+              <a:ext uri="{FF2B5EF4-FFF2-40B4-BE49-F238E27FC236}">
+                <a16:creationId xmlns:a16="http://schemas.microsoft.com/office/drawing/2014/main" id="{B4CD6F79-C664-4BDA-BE69-3952C9F55614}"/>
+              </a:ext>
+            </a:extLst>
+          </p:cNvPr>
+          <p:cNvPicPr>
+            <a:picLocks noChangeAspect="1"/>
+          </p:cNvPicPr>
+          <p:nvPr/>
+        </p:nvPicPr>
+        <p:blipFill>
+          <a:blip r:embed="rId2">
+            <a:extLst>
+              <a:ext uri="{96DAC541-7B7A-43D3-8B79-37D633B846F1}">
+                <asvg:svgBlip xmlns:asvg="http://schemas.microsoft.com/office/drawing/2016/SVG/main" r:embed="rId3"/>
+              </a:ext>
+            </a:extLst>
+          </a:blip>
+          <a:stretch>
+            <a:fillRect/>
+          </a:stretch>
+        </p:blipFill>
+        <p:spPr>
+          <a:xfrm>
+            <a:off x="689704" y="621647"/>
+            <a:ext cx="745798" cy="745798"/>
+          </a:xfrm>
+          <a:prstGeom prst="rect">
+            <a:avLst/>
+          </a:prstGeom>
+        </p:spPr>
+      </p:pic>
+      <p:pic>
+        <p:nvPicPr>
+          <p:cNvPr id="8" name="Imagem 7">
+            <a:extLst>
+              <a:ext uri="{FF2B5EF4-FFF2-40B4-BE49-F238E27FC236}">
+                <a16:creationId xmlns:a16="http://schemas.microsoft.com/office/drawing/2014/main" id="{4905842B-768A-4C4D-9E50-8EBC3F39B7F3}"/>
+              </a:ext>
+            </a:extLst>
+          </p:cNvPr>
+          <p:cNvPicPr>
+            <a:picLocks noChangeAspect="1"/>
+          </p:cNvPicPr>
+          <p:nvPr/>
+        </p:nvPicPr>
+        <p:blipFill>
+          <a:blip r:embed="rId4"/>
+          <a:stretch>
+            <a:fillRect/>
+          </a:stretch>
+        </p:blipFill>
+        <p:spPr>
+          <a:xfrm>
+            <a:off x="838200" y="3418382"/>
+            <a:ext cx="2876351" cy="1059955"/>
+          </a:xfrm>
+          <a:prstGeom prst="rect">
+            <a:avLst/>
+          </a:prstGeom>
+        </p:spPr>
+      </p:pic>
+      <p:pic>
+        <p:nvPicPr>
+          <p:cNvPr id="1026" name="Picture 2" descr="Why Test-Driven Development (TDD) | Marsner Technologies">
+            <a:extLst>
+              <a:ext uri="{FF2B5EF4-FFF2-40B4-BE49-F238E27FC236}">
+                <a16:creationId xmlns:a16="http://schemas.microsoft.com/office/drawing/2014/main" id="{95484AF9-CE33-4B55-A8DF-1D72C7701015}"/>
+              </a:ext>
+            </a:extLst>
+          </p:cNvPr>
+          <p:cNvPicPr>
+            <a:picLocks noChangeAspect="1" noChangeArrowheads="1"/>
+          </p:cNvPicPr>
+          <p:nvPr/>
+        </p:nvPicPr>
+        <p:blipFill>
+          <a:blip r:embed="rId5">
+            <a:extLst>
+              <a:ext uri="{28A0092B-C50C-407E-A947-70E740481C1C}">
+                <a14:useLocalDpi xmlns:a14="http://schemas.microsoft.com/office/drawing/2010/main" val="0"/>
+              </a:ext>
+            </a:extLst>
+          </a:blip>
+          <a:srcRect/>
+          <a:stretch>
+            <a:fillRect/>
+          </a:stretch>
+        </p:blipFill>
+        <p:spPr bwMode="auto">
+          <a:xfrm>
+            <a:off x="4053524" y="3198265"/>
+            <a:ext cx="2259107" cy="1500188"/>
+          </a:xfrm>
+          <a:prstGeom prst="rect">
+            <a:avLst/>
+          </a:prstGeom>
+          <a:noFill/>
+          <a:ln>
+            <a:solidFill>
+              <a:schemeClr val="bg1"/>
+            </a:solidFill>
+          </a:ln>
+          <a:extLst>
+            <a:ext uri="{909E8E84-426E-40DD-AFC4-6F175D3DCCD1}">
+              <a14:hiddenFill xmlns:a14="http://schemas.microsoft.com/office/drawing/2010/main">
                 <a:solidFill>
-                  <a:schemeClr val="tx1"/>
+                  <a:srgbClr val="FFFFFF"/>
                 </a:solidFill>
-              </a:rPr>
-              <a:t>Concisa</a:t>
-            </a:r>
-          </a:p>
-        </p:txBody>
-      </p:sp>
-      <p:sp>
-        <p:nvSpPr>
-          <p:cNvPr id="23" name="Elipse 22">
-            <a:extLst>
-              <a:ext uri="{FF2B5EF4-FFF2-40B4-BE49-F238E27FC236}">
-                <a16:creationId xmlns:a16="http://schemas.microsoft.com/office/drawing/2014/main" id="{36E96FB9-3827-44FD-831D-BEF0A48295F0}"/>
-              </a:ext>
-            </a:extLst>
-          </p:cNvPr>
-          <p:cNvSpPr/>
+              </a14:hiddenFill>
+            </a:ext>
+          </a:extLst>
+        </p:spPr>
+      </p:pic>
+      <p:pic>
+        <p:nvPicPr>
+          <p:cNvPr id="1032" name="Picture 8" descr="Curso Online BDD e Java: Behavior Driven Development com Cucumber | Alura">
+            <a:extLst>
+              <a:ext uri="{FF2B5EF4-FFF2-40B4-BE49-F238E27FC236}">
+                <a16:creationId xmlns:a16="http://schemas.microsoft.com/office/drawing/2014/main" id="{B91D822F-B295-4EB3-9DF2-B804FF879B5D}"/>
+              </a:ext>
+            </a:extLst>
+          </p:cNvPr>
+          <p:cNvPicPr>
+            <a:picLocks noChangeAspect="1" noChangeArrowheads="1"/>
+          </p:cNvPicPr>
           <p:nvPr/>
-        </p:nvSpPr>
-        <p:spPr>
-          <a:xfrm>
-            <a:off x="7499199" y="4721014"/>
-            <a:ext cx="2265531" cy="745798"/>
-          </a:xfrm>
-          <a:prstGeom prst="ellipse">
-            <a:avLst/>
-          </a:prstGeom>
-          <a:solidFill>
-            <a:schemeClr val="bg1"/>
-          </a:solidFill>
+        </p:nvPicPr>
+        <p:blipFill>
+          <a:blip r:embed="rId6">
+            <a:extLst>
+              <a:ext uri="{28A0092B-C50C-407E-A947-70E740481C1C}">
+                <a14:useLocalDpi xmlns:a14="http://schemas.microsoft.com/office/drawing/2010/main" val="0"/>
+              </a:ext>
+            </a:extLst>
+          </a:blip>
+          <a:srcRect/>
+          <a:stretch>
+            <a:fillRect/>
+          </a:stretch>
+        </p:blipFill>
+        <p:spPr bwMode="auto">
+          <a:xfrm>
+            <a:off x="6762796" y="3244754"/>
+            <a:ext cx="1407209" cy="1407209"/>
+          </a:xfrm>
+          <a:prstGeom prst="rect">
+            <a:avLst/>
+          </a:prstGeom>
+          <a:noFill/>
+          <a:extLst>
+            <a:ext uri="{909E8E84-426E-40DD-AFC4-6F175D3DCCD1}">
+              <a14:hiddenFill xmlns:a14="http://schemas.microsoft.com/office/drawing/2010/main">
+                <a:solidFill>
+                  <a:srgbClr val="FFFFFF"/>
+                </a:solidFill>
+              </a14:hiddenFill>
+            </a:ext>
+          </a:extLst>
+        </p:spPr>
+      </p:pic>
+      <p:pic>
+        <p:nvPicPr>
+          <p:cNvPr id="1034" name="Picture 10" descr="BDD - Test Management">
+            <a:extLst>
+              <a:ext uri="{FF2B5EF4-FFF2-40B4-BE49-F238E27FC236}">
+                <a16:creationId xmlns:a16="http://schemas.microsoft.com/office/drawing/2014/main" id="{9C3F32B8-2044-4D94-B196-F31C2E993116}"/>
+              </a:ext>
+            </a:extLst>
+          </p:cNvPr>
+          <p:cNvPicPr>
+            <a:picLocks noChangeAspect="1" noChangeArrowheads="1"/>
+          </p:cNvPicPr>
+          <p:nvPr/>
+        </p:nvPicPr>
+        <p:blipFill>
+          <a:blip r:embed="rId7">
+            <a:extLst>
+              <a:ext uri="{28A0092B-C50C-407E-A947-70E740481C1C}">
+                <a14:useLocalDpi xmlns:a14="http://schemas.microsoft.com/office/drawing/2010/main" val="0"/>
+              </a:ext>
+            </a:extLst>
+          </a:blip>
+          <a:srcRect/>
+          <a:stretch>
+            <a:fillRect/>
+          </a:stretch>
+        </p:blipFill>
+        <p:spPr bwMode="auto">
+          <a:xfrm>
+            <a:off x="8434806" y="2974076"/>
+            <a:ext cx="2635103" cy="1948563"/>
+          </a:xfrm>
+          <a:prstGeom prst="rect">
+            <a:avLst/>
+          </a:prstGeom>
+          <a:noFill/>
+          <a:extLst>
+            <a:ext uri="{909E8E84-426E-40DD-AFC4-6F175D3DCCD1}">
+              <a14:hiddenFill xmlns:a14="http://schemas.microsoft.com/office/drawing/2010/main">
+                <a:solidFill>
+                  <a:srgbClr val="FFFFFF"/>
+                </a:solidFill>
+              </a14:hiddenFill>
+            </a:ext>
+          </a:extLst>
+        </p:spPr>
+      </p:pic>
+      <p:cxnSp>
+        <p:nvCxnSpPr>
+          <p:cNvPr id="12" name="Conector de Seta Reta 11">
+            <a:extLst>
+              <a:ext uri="{FF2B5EF4-FFF2-40B4-BE49-F238E27FC236}">
+                <a16:creationId xmlns:a16="http://schemas.microsoft.com/office/drawing/2014/main" id="{96210B68-72D1-486B-9269-1D515E8A3D06}"/>
+              </a:ext>
+            </a:extLst>
+          </p:cNvPr>
+          <p:cNvCxnSpPr>
+            <a:cxnSpLocks/>
+            <a:stCxn id="8" idx="3"/>
+          </p:cNvCxnSpPr>
+          <p:nvPr/>
+        </p:nvCxnSpPr>
+        <p:spPr>
+          <a:xfrm>
+            <a:off x="3714551" y="3948360"/>
+            <a:ext cx="805324" cy="0"/>
+          </a:xfrm>
+          <a:prstGeom prst="straightConnector1">
+            <a:avLst/>
+          </a:prstGeom>
           <a:ln>
             <a:solidFill>
               <a:schemeClr val="tx1"/>
             </a:solidFill>
+            <a:tailEnd type="triangle"/>
           </a:ln>
         </p:spPr>
         <p:style>
-          <a:lnRef idx="2">
-            <a:schemeClr val="accent1">
-              <a:shade val="50000"/>
-            </a:schemeClr>
+          <a:lnRef idx="1">
+            <a:schemeClr val="accent1"/>
           </a:lnRef>
-          <a:fillRef idx="1">
+          <a:fillRef idx="0">
             <a:schemeClr val="accent1"/>
           </a:fillRef>
           <a:effectRef idx="0">
             <a:schemeClr val="accent1"/>
           </a:effectRef>
           <a:fontRef idx="minor">
-            <a:schemeClr val="lt1"/>
+            <a:schemeClr val="tx1"/>
           </a:fontRef>
         </p:style>
-        <p:txBody>
-          <a:bodyPr rtlCol="0" anchor="ctr"/>
-          <a:lstStyle/>
-          <a:p>
-            <a:pPr algn="ctr"/>
-            <a:r>
-              <a:rPr lang="pt-BR" dirty="0">
-                <a:solidFill>
-                  <a:schemeClr val="tx1"/>
-                </a:solidFill>
-              </a:rPr>
-              <a:t>Clara</a:t>
-            </a:r>
-          </a:p>
-        </p:txBody>
-      </p:sp>
-      <p:sp>
-        <p:nvSpPr>
-          <p:cNvPr id="24" name="Elipse 23">
-            <a:extLst>
-              <a:ext uri="{FF2B5EF4-FFF2-40B4-BE49-F238E27FC236}">
-                <a16:creationId xmlns:a16="http://schemas.microsoft.com/office/drawing/2014/main" id="{FF9D9978-7089-4E34-A81A-B6D8F21EDD3F}"/>
-              </a:ext>
-            </a:extLst>
-          </p:cNvPr>
-          <p:cNvSpPr/>
+      </p:cxnSp>
+      <p:cxnSp>
+        <p:nvCxnSpPr>
+          <p:cNvPr id="16" name="Conector de Seta Reta 15">
+            <a:extLst>
+              <a:ext uri="{FF2B5EF4-FFF2-40B4-BE49-F238E27FC236}">
+                <a16:creationId xmlns:a16="http://schemas.microsoft.com/office/drawing/2014/main" id="{6AE7B240-DF44-4CEA-B16D-59AA69989E18}"/>
+              </a:ext>
+            </a:extLst>
+          </p:cNvPr>
+          <p:cNvCxnSpPr>
+            <a:cxnSpLocks/>
+          </p:cNvCxnSpPr>
           <p:nvPr/>
-        </p:nvSpPr>
-        <p:spPr>
-          <a:xfrm>
-            <a:off x="3672973" y="5590188"/>
-            <a:ext cx="2265531" cy="745798"/>
-          </a:xfrm>
-          <a:prstGeom prst="ellipse">
-            <a:avLst/>
-          </a:prstGeom>
-          <a:solidFill>
-            <a:schemeClr val="bg1"/>
-          </a:solidFill>
+        </p:nvCxnSpPr>
+        <p:spPr>
+          <a:xfrm>
+            <a:off x="5871597" y="3948359"/>
+            <a:ext cx="556591" cy="0"/>
+          </a:xfrm>
+          <a:prstGeom prst="straightConnector1">
+            <a:avLst/>
+          </a:prstGeom>
           <a:ln>
             <a:solidFill>
               <a:schemeClr val="tx1"/>
             </a:solidFill>
+            <a:tailEnd type="triangle"/>
           </a:ln>
         </p:spPr>
         <p:style>
-          <a:lnRef idx="2">
-            <a:schemeClr val="accent1">
-              <a:shade val="50000"/>
-            </a:schemeClr>
+          <a:lnRef idx="1">
+            <a:schemeClr val="accent1"/>
           </a:lnRef>
-          <a:fillRef idx="1">
+          <a:fillRef idx="0">
             <a:schemeClr val="accent1"/>
           </a:fillRef>
           <a:effectRef idx="0">
             <a:schemeClr val="accent1"/>
           </a:effectRef>
           <a:fontRef idx="minor">
-            <a:schemeClr val="lt1"/>
+            <a:schemeClr val="tx1"/>
           </a:fontRef>
         </p:style>
-        <p:txBody>
-          <a:bodyPr rtlCol="0" anchor="ctr"/>
+      </p:cxnSp>
+      <p:sp>
+        <p:nvSpPr>
+          <p:cNvPr id="19" name="CaixaDeTexto 18">
+            <a:extLst>
+              <a:ext uri="{FF2B5EF4-FFF2-40B4-BE49-F238E27FC236}">
+                <a16:creationId xmlns:a16="http://schemas.microsoft.com/office/drawing/2014/main" id="{3C12A7F1-E6E7-421E-866C-34D0501EDA58}"/>
+              </a:ext>
+            </a:extLst>
+          </p:cNvPr>
+          <p:cNvSpPr txBox="1"/>
+          <p:nvPr/>
+        </p:nvSpPr>
+        <p:spPr>
+          <a:xfrm>
+            <a:off x="8885919" y="2374305"/>
+            <a:ext cx="1891907" cy="646331"/>
+          </a:xfrm>
+          <a:prstGeom prst="rect">
+            <a:avLst/>
+          </a:prstGeom>
+          <a:noFill/>
+        </p:spPr>
+        <p:txBody>
+          <a:bodyPr wrap="square" rtlCol="0">
+            <a:spAutoFit/>
+          </a:bodyPr>
           <a:lstStyle/>
           <a:p>
             <a:pPr algn="ctr"/>
             <a:r>
-              <a:rPr lang="pt-BR" dirty="0">
-                <a:solidFill>
-                  <a:schemeClr val="tx1"/>
-                </a:solidFill>
-              </a:rPr>
-              <a:t>Coerente</a:t>
-            </a:r>
-          </a:p>
-        </p:txBody>
-      </p:sp>
-      <p:sp>
-        <p:nvSpPr>
-          <p:cNvPr id="25" name="Elipse 24">
-            <a:extLst>
-              <a:ext uri="{FF2B5EF4-FFF2-40B4-BE49-F238E27FC236}">
-                <a16:creationId xmlns:a16="http://schemas.microsoft.com/office/drawing/2014/main" id="{9898F11C-439A-4E82-A38F-57CE12EE74A0}"/>
-              </a:ext>
-            </a:extLst>
-          </p:cNvPr>
-          <p:cNvSpPr/>
+              <a:rPr lang="pt-BR" dirty="0"/>
+              <a:t>Sintaxe </a:t>
+            </a:r>
+            <a:r>
+              <a:rPr lang="pt-BR" i="1" dirty="0" err="1"/>
+              <a:t>Gherkin</a:t>
+            </a:r>
+            <a:r>
+              <a:rPr lang="pt-BR" i="1" dirty="0"/>
+              <a:t> </a:t>
+            </a:r>
+            <a:r>
+              <a:rPr lang="pt-BR" dirty="0"/>
+              <a:t>e </a:t>
+            </a:r>
+          </a:p>
+          <a:p>
+            <a:pPr algn="ctr"/>
+            <a:r>
+              <a:rPr lang="pt-BR" dirty="0"/>
+              <a:t>linguagem ubíqua</a:t>
+            </a:r>
+            <a:endParaRPr lang="pt-BR" i="1" dirty="0"/>
+          </a:p>
+        </p:txBody>
+      </p:sp>
+      <p:sp>
+        <p:nvSpPr>
+          <p:cNvPr id="20" name="CaixaDeTexto 19">
+            <a:extLst>
+              <a:ext uri="{FF2B5EF4-FFF2-40B4-BE49-F238E27FC236}">
+                <a16:creationId xmlns:a16="http://schemas.microsoft.com/office/drawing/2014/main" id="{0DD88253-A17A-4D2E-9364-286F1724D640}"/>
+              </a:ext>
+            </a:extLst>
+          </p:cNvPr>
+          <p:cNvSpPr txBox="1"/>
           <p:nvPr/>
         </p:nvSpPr>
         <p:spPr>
           <a:xfrm>
-            <a:off x="6366433" y="5590188"/>
-            <a:ext cx="2265531" cy="745798"/>
-          </a:xfrm>
-          <a:prstGeom prst="ellipse">
-            <a:avLst/>
-          </a:prstGeom>
-          <a:solidFill>
-            <a:schemeClr val="bg1"/>
-          </a:solidFill>
+            <a:off x="6111218" y="5646577"/>
+            <a:ext cx="5549401" cy="923330"/>
+          </a:xfrm>
+          <a:prstGeom prst="rect">
+            <a:avLst/>
+          </a:prstGeom>
+          <a:noFill/>
           <a:ln>
             <a:solidFill>
               <a:schemeClr val="tx1"/>
             </a:solidFill>
           </a:ln>
         </p:spPr>
+        <p:txBody>
+          <a:bodyPr wrap="square" rtlCol="0">
+            <a:spAutoFit/>
+          </a:bodyPr>
+          <a:lstStyle/>
+          <a:p>
+            <a:pPr algn="just"/>
+            <a:r>
+              <a:rPr lang="pt-BR" dirty="0"/>
+              <a:t>“Não é um meio de testar </a:t>
+            </a:r>
+            <a:r>
+              <a:rPr lang="pt-BR" i="1" dirty="0"/>
+              <a:t>software</a:t>
+            </a:r>
+            <a:r>
+              <a:rPr lang="pt-BR" dirty="0"/>
+              <a:t>, mas sim de testar o entendimento das pessoas em como um </a:t>
+            </a:r>
+            <a:r>
+              <a:rPr lang="pt-BR" i="1" dirty="0"/>
+              <a:t>software</a:t>
+            </a:r>
+            <a:r>
+              <a:rPr lang="pt-BR" dirty="0"/>
+              <a:t>, ainda a ser escrito, deve se comportar”</a:t>
+            </a:r>
+          </a:p>
+        </p:txBody>
+      </p:sp>
+      <p:cxnSp>
+        <p:nvCxnSpPr>
+          <p:cNvPr id="22" name="Conector de Seta Reta 21">
+            <a:extLst>
+              <a:ext uri="{FF2B5EF4-FFF2-40B4-BE49-F238E27FC236}">
+                <a16:creationId xmlns:a16="http://schemas.microsoft.com/office/drawing/2014/main" id="{790448D3-BADC-4C11-86EF-C64081B2B4EF}"/>
+              </a:ext>
+            </a:extLst>
+          </p:cNvPr>
+          <p:cNvCxnSpPr>
+            <a:stCxn id="18" idx="2"/>
+            <a:endCxn id="20" idx="0"/>
+          </p:cNvCxnSpPr>
+          <p:nvPr/>
+        </p:nvCxnSpPr>
+        <p:spPr>
+          <a:xfrm flipH="1">
+            <a:off x="8885919" y="5197267"/>
+            <a:ext cx="5075" cy="449310"/>
+          </a:xfrm>
+          <a:prstGeom prst="straightConnector1">
+            <a:avLst/>
+          </a:prstGeom>
+          <a:ln>
+            <a:solidFill>
+              <a:schemeClr val="tx1"/>
+            </a:solidFill>
+            <a:tailEnd type="triangle"/>
+          </a:ln>
+        </p:spPr>
         <p:style>
-          <a:lnRef idx="2">
-            <a:schemeClr val="accent1">
-              <a:shade val="50000"/>
-            </a:schemeClr>
+          <a:lnRef idx="1">
+            <a:schemeClr val="accent1"/>
           </a:lnRef>
-          <a:fillRef idx="1">
+          <a:fillRef idx="0">
             <a:schemeClr val="accent1"/>
           </a:fillRef>
           <a:effectRef idx="0">
             <a:schemeClr val="accent1"/>
           </a:effectRef>
           <a:fontRef idx="minor">
-            <a:schemeClr val="lt1"/>
+            <a:schemeClr val="tx1"/>
           </a:fontRef>
         </p:style>
-        <p:txBody>
-          <a:bodyPr rtlCol="0" anchor="ctr"/>
-          <a:lstStyle/>
-          <a:p>
-            <a:pPr algn="ctr"/>
-            <a:r>
-              <a:rPr lang="pt-BR" dirty="0">
+      </p:cxnSp>
+      <p:pic>
+        <p:nvPicPr>
+          <p:cNvPr id="1038" name="Picture 14" descr="Line,Icon,Circle,Symbol,Logo #47838 - Free Icon Library">
+            <a:extLst>
+              <a:ext uri="{FF2B5EF4-FFF2-40B4-BE49-F238E27FC236}">
+                <a16:creationId xmlns:a16="http://schemas.microsoft.com/office/drawing/2014/main" id="{49B66718-3327-42C4-8B61-FFE40C1088B9}"/>
+              </a:ext>
+            </a:extLst>
+          </p:cNvPr>
+          <p:cNvPicPr>
+            <a:picLocks noChangeAspect="1" noChangeArrowheads="1"/>
+          </p:cNvPicPr>
+          <p:nvPr/>
+        </p:nvPicPr>
+        <p:blipFill>
+          <a:blip r:embed="rId8">
+            <a:extLst>
+              <a:ext uri="{28A0092B-C50C-407E-A947-70E740481C1C}">
+                <a14:useLocalDpi xmlns:a14="http://schemas.microsoft.com/office/drawing/2010/main" val="0"/>
+              </a:ext>
+            </a:extLst>
+          </a:blip>
+          <a:srcRect/>
+          <a:stretch>
+            <a:fillRect/>
+          </a:stretch>
+        </p:blipFill>
+        <p:spPr bwMode="auto">
+          <a:xfrm>
+            <a:off x="838200" y="5720509"/>
+            <a:ext cx="656642" cy="656642"/>
+          </a:xfrm>
+          <a:prstGeom prst="rect">
+            <a:avLst/>
+          </a:prstGeom>
+          <a:noFill/>
+          <a:extLst>
+            <a:ext uri="{909E8E84-426E-40DD-AFC4-6F175D3DCCD1}">
+              <a14:hiddenFill xmlns:a14="http://schemas.microsoft.com/office/drawing/2010/main">
                 <a:solidFill>
-                  <a:schemeClr val="tx1"/>
+                  <a:srgbClr val="FFFFFF"/>
                 </a:solidFill>
-              </a:rPr>
-              <a:t>Controlada</a:t>
-            </a:r>
-          </a:p>
-        </p:txBody>
-      </p:sp>
+              </a14:hiddenFill>
+            </a:ext>
+          </a:extLst>
+        </p:spPr>
+      </p:pic>
+      <p:sp>
+        <p:nvSpPr>
+          <p:cNvPr id="26" name="CaixaDeTexto 25">
+            <a:extLst>
+              <a:ext uri="{FF2B5EF4-FFF2-40B4-BE49-F238E27FC236}">
+                <a16:creationId xmlns:a16="http://schemas.microsoft.com/office/drawing/2014/main" id="{7DC88D43-8DAF-4AC0-86D9-6452DDD7BFED}"/>
+              </a:ext>
+            </a:extLst>
+          </p:cNvPr>
+          <p:cNvSpPr txBox="1"/>
+          <p:nvPr/>
+        </p:nvSpPr>
+        <p:spPr>
+          <a:xfrm>
+            <a:off x="1494842" y="5727695"/>
+            <a:ext cx="3464057" cy="923330"/>
+          </a:xfrm>
+          <a:prstGeom prst="rect">
+            <a:avLst/>
+          </a:prstGeom>
+          <a:noFill/>
+        </p:spPr>
+        <p:txBody>
+          <a:bodyPr wrap="square" rtlCol="0">
+            <a:spAutoFit/>
+          </a:bodyPr>
+          <a:lstStyle/>
+          <a:p>
+            <a:pPr algn="just"/>
+            <a:r>
+              <a:rPr lang="pt-BR" dirty="0"/>
+              <a:t>14 fatores para escrita de cenários </a:t>
+            </a:r>
+          </a:p>
+          <a:p>
+            <a:pPr algn="just"/>
+            <a:r>
+              <a:rPr lang="pt-BR" dirty="0"/>
+              <a:t>BDD com qualidade</a:t>
+            </a:r>
+          </a:p>
+          <a:p>
+            <a:pPr algn="just"/>
+            <a:endParaRPr lang="pt-BR" dirty="0"/>
+          </a:p>
+        </p:txBody>
+      </p:sp>
+      <p:cxnSp>
+        <p:nvCxnSpPr>
+          <p:cNvPr id="29" name="Conector de Seta Reta 28">
+            <a:extLst>
+              <a:ext uri="{FF2B5EF4-FFF2-40B4-BE49-F238E27FC236}">
+                <a16:creationId xmlns:a16="http://schemas.microsoft.com/office/drawing/2014/main" id="{3461D599-5C03-417A-9327-A2B9CDE4D3E5}"/>
+              </a:ext>
+            </a:extLst>
+          </p:cNvPr>
+          <p:cNvCxnSpPr>
+            <a:stCxn id="20" idx="1"/>
+            <a:endCxn id="27" idx="3"/>
+          </p:cNvCxnSpPr>
+          <p:nvPr/>
+        </p:nvCxnSpPr>
+        <p:spPr>
+          <a:xfrm flipH="1">
+            <a:off x="5183077" y="6108242"/>
+            <a:ext cx="928141" cy="705"/>
+          </a:xfrm>
+          <a:prstGeom prst="straightConnector1">
+            <a:avLst/>
+          </a:prstGeom>
+          <a:ln>
+            <a:solidFill>
+              <a:schemeClr val="tx1"/>
+            </a:solidFill>
+            <a:tailEnd type="triangle"/>
+          </a:ln>
+        </p:spPr>
+        <p:style>
+          <a:lnRef idx="1">
+            <a:schemeClr val="accent1"/>
+          </a:lnRef>
+          <a:fillRef idx="0">
+            <a:schemeClr val="accent1"/>
+          </a:fillRef>
+          <a:effectRef idx="0">
+            <a:schemeClr val="accent1"/>
+          </a:effectRef>
+          <a:fontRef idx="minor">
+            <a:schemeClr val="tx1"/>
+          </a:fontRef>
+        </p:style>
+      </p:cxnSp>
+      <p:pic>
+        <p:nvPicPr>
+          <p:cNvPr id="1040" name="Picture 16" descr="Requirements Engineering Tutorial - Tonex Training">
+            <a:extLst>
+              <a:ext uri="{FF2B5EF4-FFF2-40B4-BE49-F238E27FC236}">
+                <a16:creationId xmlns:a16="http://schemas.microsoft.com/office/drawing/2014/main" id="{7C93ECA4-E813-419A-9121-9C5F288DA8F4}"/>
+              </a:ext>
+            </a:extLst>
+          </p:cNvPr>
+          <p:cNvPicPr>
+            <a:picLocks noChangeAspect="1" noChangeArrowheads="1"/>
+          </p:cNvPicPr>
+          <p:nvPr/>
+        </p:nvPicPr>
+        <p:blipFill>
+          <a:blip r:embed="rId9">
+            <a:extLst>
+              <a:ext uri="{28A0092B-C50C-407E-A947-70E740481C1C}">
+                <a14:useLocalDpi xmlns:a14="http://schemas.microsoft.com/office/drawing/2010/main" val="0"/>
+              </a:ext>
+            </a:extLst>
+          </a:blip>
+          <a:srcRect/>
+          <a:stretch>
+            <a:fillRect/>
+          </a:stretch>
+        </p:blipFill>
+        <p:spPr bwMode="auto">
+          <a:xfrm>
+            <a:off x="6704696" y="2384457"/>
+            <a:ext cx="745798" cy="515166"/>
+          </a:xfrm>
+          <a:prstGeom prst="rect">
+            <a:avLst/>
+          </a:prstGeom>
+          <a:noFill/>
+          <a:extLst>
+            <a:ext uri="{909E8E84-426E-40DD-AFC4-6F175D3DCCD1}">
+              <a14:hiddenFill xmlns:a14="http://schemas.microsoft.com/office/drawing/2010/main">
+                <a:solidFill>
+                  <a:srgbClr val="FFFFFF"/>
+                </a:solidFill>
+              </a14:hiddenFill>
+            </a:ext>
+          </a:extLst>
+        </p:spPr>
+      </p:pic>
     </p:spTree>
     <p:extLst>
       <p:ext uri="{BB962C8B-B14F-4D97-AF65-F5344CB8AC3E}">
-        <p14:creationId xmlns:p14="http://schemas.microsoft.com/office/powerpoint/2010/main" val="1154063287"/>
+        <p14:creationId xmlns:p14="http://schemas.microsoft.com/office/powerpoint/2010/main" val="2952457486"/>
       </p:ext>
     </p:extLst>
   </p:cSld>

</xml_diff>